<commit_message>
implementação g-rpc e alteração slide DIP
</commit_message>
<xml_diff>
--- a/slides/01 - Principio-de-Inversao-de-Dependencia.pptx
+++ b/slides/01 - Principio-de-Inversao-de-Dependencia.pptx
@@ -5,16 +5,17 @@
     <p:sldMasterId id="2147483648" r:id="rId1"/>
   </p:sldMasterIdLst>
   <p:notesMasterIdLst>
-    <p:notesMasterId r:id="rId9"/>
+    <p:notesMasterId r:id="rId10"/>
   </p:notesMasterIdLst>
   <p:sldIdLst>
     <p:sldId id="267" r:id="rId2"/>
     <p:sldId id="257" r:id="rId3"/>
     <p:sldId id="259" r:id="rId4"/>
-    <p:sldId id="260" r:id="rId5"/>
-    <p:sldId id="262" r:id="rId6"/>
-    <p:sldId id="263" r:id="rId7"/>
-    <p:sldId id="266" r:id="rId8"/>
+    <p:sldId id="262" r:id="rId5"/>
+    <p:sldId id="260" r:id="rId6"/>
+    <p:sldId id="268" r:id="rId7"/>
+    <p:sldId id="269" r:id="rId8"/>
+    <p:sldId id="266" r:id="rId9"/>
   </p:sldIdLst>
   <p:sldSz cx="14630400" cy="8229600"/>
   <p:notesSz cx="8229600" cy="14630400"/>
@@ -730,7 +731,7 @@
               <a:rPr lang="en-US"/>
               <a:t>6</a:t>
             </a:fld>
-            <a:endParaRPr lang="en-US"/>
+            <a:endParaRPr lang="en-US" dirty="0"/>
           </a:p>
         </p:txBody>
       </p:sp>
@@ -813,6 +814,90 @@
             <a:fld id="{F7021451-1387-4CA6-816F-3879F97B5CBC}" type="slidenum">
               <a:rPr lang="en-US"/>
               <a:t>7</a:t>
+            </a:fld>
+            <a:endParaRPr lang="en-US" dirty="0"/>
+          </a:p>
+        </p:txBody>
+      </p:sp>
+    </p:spTree>
+    <p:extLst>
+      <p:ext uri="{BB962C8B-B14F-4D97-AF65-F5344CB8AC3E}">
+        <p14:creationId xmlns:p14="http://schemas.microsoft.com/office/powerpoint/2010/main" val="1024086991"/>
+      </p:ext>
+    </p:extLst>
+  </p:cSld>
+  <p:clrMapOvr>
+    <a:masterClrMapping/>
+  </p:clrMapOvr>
+</p:notes>
+</file>
+
+<file path=ppt/notesSlides/notesSlide8.xml><?xml version="1.0" encoding="utf-8"?>
+<p:notes xmlns:a="http://schemas.openxmlformats.org/drawingml/2006/main" xmlns:r="http://schemas.openxmlformats.org/officeDocument/2006/relationships" xmlns:p="http://schemas.openxmlformats.org/presentationml/2006/main">
+  <p:cSld>
+    <p:spTree>
+      <p:nvGrpSpPr>
+        <p:cNvPr id="1" name=""/>
+        <p:cNvGrpSpPr/>
+        <p:nvPr/>
+      </p:nvGrpSpPr>
+      <p:grpSpPr>
+        <a:xfrm>
+          <a:off x="0" y="0"/>
+          <a:ext cx="0" cy="0"/>
+          <a:chOff x="0" y="0"/>
+          <a:chExt cx="0" cy="0"/>
+        </a:xfrm>
+      </p:grpSpPr>
+      <p:sp>
+        <p:nvSpPr>
+          <p:cNvPr id="2" name="Slide Image Placeholder 1"/>
+          <p:cNvSpPr>
+            <a:spLocks noGrp="1" noRot="1" noChangeAspect="1"/>
+          </p:cNvSpPr>
+          <p:nvPr>
+            <p:ph type="sldImg"/>
+          </p:nvPr>
+        </p:nvSpPr>
+        <p:spPr/>
+      </p:sp>
+      <p:sp>
+        <p:nvSpPr>
+          <p:cNvPr id="3" name="Notes Placeholder 2"/>
+          <p:cNvSpPr>
+            <a:spLocks noGrp="1"/>
+          </p:cNvSpPr>
+          <p:nvPr>
+            <p:ph type="body" idx="1"/>
+          </p:nvPr>
+        </p:nvSpPr>
+        <p:spPr/>
+        <p:txBody>
+          <a:bodyPr/>
+          <a:lstStyle/>
+          <a:p>
+            <a:endParaRPr lang="en-US" dirty="0"/>
+          </a:p>
+        </p:txBody>
+      </p:sp>
+      <p:sp>
+        <p:nvSpPr>
+          <p:cNvPr id="4" name="Slide Number Placeholder 3"/>
+          <p:cNvSpPr>
+            <a:spLocks noGrp="1"/>
+          </p:cNvSpPr>
+          <p:nvPr>
+            <p:ph type="sldNum" sz="quarter" idx="10"/>
+          </p:nvPr>
+        </p:nvSpPr>
+        <p:spPr/>
+        <p:txBody>
+          <a:bodyPr/>
+          <a:lstStyle/>
+          <a:p>
+            <a:fld id="{F7021451-1387-4CA6-816F-3879F97B5CBC}" type="slidenum">
+              <a:rPr lang="en-US"/>
+              <a:t>8</a:t>
             </a:fld>
             <a:endParaRPr lang="en-US" dirty="0"/>
           </a:p>
@@ -1520,16 +1605,53 @@
               <a:buNone/>
             </a:pPr>
             <a:r>
-              <a:rPr lang="en-US" sz="2000" dirty="0">
+              <a:rPr lang="pt-BR" sz="2000" dirty="0">
                 <a:solidFill>
                   <a:srgbClr val="EBECEF"/>
                 </a:solidFill>
                 <a:latin typeface="Epilogue" pitchFamily="34" charset="0"/>
                 <a:ea typeface="Epilogue" pitchFamily="34" charset="-122"/>
-                <a:cs typeface="Epilogue" pitchFamily="34" charset="-120"/>
               </a:rPr>
               <a:t>O Princípio de Inversão de Dependência é um conceito da programação que define que módulos de baixo nível não devem depender de módulos de alto nível e sim ambos devem depender de uma abstração.</a:t>
             </a:r>
+          </a:p>
+          <a:p>
+            <a:pPr marL="0" indent="0">
+              <a:lnSpc>
+                <a:spcPts val="2654"/>
+              </a:lnSpc>
+              <a:buNone/>
+            </a:pPr>
+            <a:endParaRPr lang="pt-BR" sz="2000" dirty="0">
+              <a:solidFill>
+                <a:srgbClr val="EBECEF"/>
+              </a:solidFill>
+              <a:latin typeface="Epilogue" pitchFamily="34" charset="0"/>
+              <a:ea typeface="Epilogue" pitchFamily="34" charset="-122"/>
+            </a:endParaRPr>
+          </a:p>
+          <a:p>
+            <a:pPr marL="0" indent="0">
+              <a:lnSpc>
+                <a:spcPts val="2654"/>
+              </a:lnSpc>
+              <a:buNone/>
+            </a:pPr>
+            <a:endParaRPr lang="en-US" sz="2000" dirty="0">
+              <a:solidFill>
+                <a:srgbClr val="EBECEF"/>
+              </a:solidFill>
+              <a:latin typeface="Epilogue" pitchFamily="34" charset="0"/>
+              <a:ea typeface="Epilogue" pitchFamily="34" charset="-122"/>
+            </a:endParaRPr>
+          </a:p>
+          <a:p>
+            <a:pPr marL="0" indent="0">
+              <a:lnSpc>
+                <a:spcPts val="2654"/>
+              </a:lnSpc>
+              <a:buNone/>
+            </a:pPr>
             <a:endParaRPr lang="en-US" sz="2000" dirty="0"/>
           </a:p>
         </p:txBody>
@@ -2204,6 +2326,762 @@
 
 <file path=ppt/slides/slide4.xml><?xml version="1.0" encoding="utf-8"?>
 <p:sld xmlns:a="http://schemas.openxmlformats.org/drawingml/2006/main" xmlns:r="http://schemas.openxmlformats.org/officeDocument/2006/relationships" xmlns:p="http://schemas.openxmlformats.org/presentationml/2006/main">
+  <p:cSld name="Slide 7">
+    <p:spTree>
+      <p:nvGrpSpPr>
+        <p:cNvPr id="1" name=""/>
+        <p:cNvGrpSpPr/>
+        <p:nvPr/>
+      </p:nvGrpSpPr>
+      <p:grpSpPr>
+        <a:xfrm>
+          <a:off x="0" y="0"/>
+          <a:ext cx="0" cy="0"/>
+          <a:chOff x="0" y="0"/>
+          <a:chExt cx="0" cy="0"/>
+        </a:xfrm>
+      </p:grpSpPr>
+      <p:sp>
+        <p:nvSpPr>
+          <p:cNvPr id="2" name="Shape 0"/>
+          <p:cNvSpPr/>
+          <p:nvPr/>
+        </p:nvSpPr>
+        <p:spPr>
+          <a:xfrm>
+            <a:off x="0" y="0"/>
+            <a:ext cx="14630400" cy="8229600"/>
+          </a:xfrm>
+          <a:prstGeom prst="rect">
+            <a:avLst/>
+          </a:prstGeom>
+          <a:solidFill>
+            <a:srgbClr val="A8AFCC"/>
+          </a:solidFill>
+          <a:ln/>
+        </p:spPr>
+        <p:txBody>
+          <a:bodyPr/>
+          <a:lstStyle/>
+          <a:p>
+            <a:endParaRPr lang="pt-BR"/>
+          </a:p>
+        </p:txBody>
+      </p:sp>
+      <p:sp>
+        <p:nvSpPr>
+          <p:cNvPr id="3" name="Shape 1"/>
+          <p:cNvSpPr/>
+          <p:nvPr/>
+        </p:nvSpPr>
+        <p:spPr>
+          <a:xfrm>
+            <a:off x="0" y="0"/>
+            <a:ext cx="14630400" cy="8229600"/>
+          </a:xfrm>
+          <a:prstGeom prst="rect">
+            <a:avLst/>
+          </a:prstGeom>
+          <a:solidFill>
+            <a:srgbClr val="080E26"/>
+          </a:solidFill>
+          <a:ln w="13811">
+            <a:solidFill>
+              <a:srgbClr val="565151"/>
+            </a:solidFill>
+            <a:prstDash val="solid"/>
+          </a:ln>
+        </p:spPr>
+        <p:txBody>
+          <a:bodyPr/>
+          <a:lstStyle/>
+          <a:p>
+            <a:endParaRPr lang="pt-BR"/>
+          </a:p>
+        </p:txBody>
+      </p:sp>
+      <p:sp>
+        <p:nvSpPr>
+          <p:cNvPr id="4" name="Text 2"/>
+          <p:cNvSpPr/>
+          <p:nvPr/>
+        </p:nvSpPr>
+        <p:spPr>
+          <a:xfrm>
+            <a:off x="2037993" y="773787"/>
+            <a:ext cx="10554414" cy="1388745"/>
+          </a:xfrm>
+          <a:prstGeom prst="rect">
+            <a:avLst/>
+          </a:prstGeom>
+          <a:noFill/>
+          <a:ln/>
+        </p:spPr>
+        <p:txBody>
+          <a:bodyPr wrap="square" rtlCol="0" anchor="t"/>
+          <a:lstStyle/>
+          <a:p>
+            <a:pPr marL="0" indent="0">
+              <a:lnSpc>
+                <a:spcPts val="5468"/>
+              </a:lnSpc>
+              <a:buNone/>
+            </a:pPr>
+            <a:r>
+              <a:rPr lang="en-US" sz="4374" dirty="0">
+                <a:solidFill>
+                  <a:srgbClr val="FFFFFF"/>
+                </a:solidFill>
+                <a:latin typeface="Fraunces" pitchFamily="34" charset="0"/>
+                <a:ea typeface="Fraunces" pitchFamily="34" charset="-122"/>
+                <a:cs typeface="Fraunces" pitchFamily="34" charset="-120"/>
+              </a:rPr>
+              <a:t>Como aplicar o Princípio de Inversão de Dependência em projetos</a:t>
+            </a:r>
+            <a:endParaRPr lang="en-US" sz="4374" dirty="0"/>
+          </a:p>
+        </p:txBody>
+      </p:sp>
+      <p:sp>
+        <p:nvSpPr>
+          <p:cNvPr id="5" name="Text 3"/>
+          <p:cNvSpPr/>
+          <p:nvPr/>
+        </p:nvSpPr>
+        <p:spPr>
+          <a:xfrm>
+            <a:off x="2037993" y="2606873"/>
+            <a:ext cx="10554414" cy="710803"/>
+          </a:xfrm>
+          <a:prstGeom prst="rect">
+            <a:avLst/>
+          </a:prstGeom>
+          <a:noFill/>
+          <a:ln/>
+        </p:spPr>
+        <p:txBody>
+          <a:bodyPr wrap="square" rtlCol="0" anchor="t"/>
+          <a:lstStyle/>
+          <a:p>
+            <a:pPr marL="0" indent="0">
+              <a:lnSpc>
+                <a:spcPts val="2799"/>
+              </a:lnSpc>
+              <a:buNone/>
+            </a:pPr>
+            <a:r>
+              <a:rPr lang="en-US" sz="2000" dirty="0">
+                <a:solidFill>
+                  <a:srgbClr val="EBECEF"/>
+                </a:solidFill>
+                <a:latin typeface="Epilogue" pitchFamily="34" charset="0"/>
+                <a:ea typeface="Epilogue" pitchFamily="34" charset="-122"/>
+                <a:cs typeface="Epilogue" pitchFamily="34" charset="-120"/>
+              </a:rPr>
+              <a:t>Para aplicar o Princípio de Inversão de Dependência em projetos, é necessário seguir algumas etapas:</a:t>
+            </a:r>
+            <a:endParaRPr lang="en-US" sz="2000" dirty="0"/>
+          </a:p>
+        </p:txBody>
+      </p:sp>
+      <p:sp>
+        <p:nvSpPr>
+          <p:cNvPr id="6" name="Shape 4"/>
+          <p:cNvSpPr/>
+          <p:nvPr/>
+        </p:nvSpPr>
+        <p:spPr>
+          <a:xfrm>
+            <a:off x="7293054" y="3567589"/>
+            <a:ext cx="44410" cy="3888224"/>
+          </a:xfrm>
+          <a:prstGeom prst="rect">
+            <a:avLst/>
+          </a:prstGeom>
+          <a:solidFill>
+            <a:srgbClr val="303B69"/>
+          </a:solidFill>
+          <a:ln/>
+        </p:spPr>
+        <p:txBody>
+          <a:bodyPr/>
+          <a:lstStyle/>
+          <a:p>
+            <a:endParaRPr lang="pt-BR"/>
+          </a:p>
+        </p:txBody>
+      </p:sp>
+      <p:sp>
+        <p:nvSpPr>
+          <p:cNvPr id="7" name="Shape 5"/>
+          <p:cNvSpPr/>
+          <p:nvPr/>
+        </p:nvSpPr>
+        <p:spPr>
+          <a:xfrm>
+            <a:off x="7565172" y="3968889"/>
+            <a:ext cx="777597" cy="44410"/>
+          </a:xfrm>
+          <a:prstGeom prst="rect">
+            <a:avLst/>
+          </a:prstGeom>
+          <a:solidFill>
+            <a:srgbClr val="303B69"/>
+          </a:solidFill>
+          <a:ln/>
+        </p:spPr>
+        <p:txBody>
+          <a:bodyPr/>
+          <a:lstStyle/>
+          <a:p>
+            <a:endParaRPr lang="pt-BR"/>
+          </a:p>
+        </p:txBody>
+      </p:sp>
+      <p:sp>
+        <p:nvSpPr>
+          <p:cNvPr id="8" name="Shape 6"/>
+          <p:cNvSpPr/>
+          <p:nvPr/>
+        </p:nvSpPr>
+        <p:spPr>
+          <a:xfrm>
+            <a:off x="7065228" y="3741182"/>
+            <a:ext cx="499943" cy="499943"/>
+          </a:xfrm>
+          <a:prstGeom prst="roundRect">
+            <a:avLst>
+              <a:gd name="adj" fmla="val 20000"/>
+            </a:avLst>
+          </a:prstGeom>
+          <a:solidFill>
+            <a:srgbClr val="283157"/>
+          </a:solidFill>
+          <a:ln w="13811">
+            <a:solidFill>
+              <a:srgbClr val="303B69"/>
+            </a:solidFill>
+            <a:prstDash val="solid"/>
+          </a:ln>
+        </p:spPr>
+        <p:txBody>
+          <a:bodyPr/>
+          <a:lstStyle/>
+          <a:p>
+            <a:endParaRPr lang="pt-BR"/>
+          </a:p>
+        </p:txBody>
+      </p:sp>
+      <p:sp>
+        <p:nvSpPr>
+          <p:cNvPr id="9" name="Text 7"/>
+          <p:cNvSpPr/>
+          <p:nvPr/>
+        </p:nvSpPr>
+        <p:spPr>
+          <a:xfrm>
+            <a:off x="7238940" y="3782854"/>
+            <a:ext cx="152400" cy="416481"/>
+          </a:xfrm>
+          <a:prstGeom prst="rect">
+            <a:avLst/>
+          </a:prstGeom>
+          <a:noFill/>
+          <a:ln/>
+        </p:spPr>
+        <p:txBody>
+          <a:bodyPr wrap="none" rtlCol="0" anchor="t"/>
+          <a:lstStyle/>
+          <a:p>
+            <a:pPr marL="0" indent="0" algn="ctr">
+              <a:lnSpc>
+                <a:spcPts val="3281"/>
+              </a:lnSpc>
+              <a:buNone/>
+            </a:pPr>
+            <a:r>
+              <a:rPr lang="en-US" sz="2624" dirty="0">
+                <a:solidFill>
+                  <a:srgbClr val="EBECEF"/>
+                </a:solidFill>
+                <a:latin typeface="Fraunces" pitchFamily="34" charset="0"/>
+                <a:ea typeface="Fraunces" pitchFamily="34" charset="-122"/>
+                <a:cs typeface="Fraunces" pitchFamily="34" charset="-120"/>
+              </a:rPr>
+              <a:t>1</a:t>
+            </a:r>
+            <a:endParaRPr lang="en-US" sz="2624" dirty="0"/>
+          </a:p>
+        </p:txBody>
+      </p:sp>
+      <p:sp>
+        <p:nvSpPr>
+          <p:cNvPr id="10" name="Text 8"/>
+          <p:cNvSpPr/>
+          <p:nvPr/>
+        </p:nvSpPr>
+        <p:spPr>
+          <a:xfrm>
+            <a:off x="8537258" y="3789759"/>
+            <a:ext cx="3131820" cy="347186"/>
+          </a:xfrm>
+          <a:prstGeom prst="rect">
+            <a:avLst/>
+          </a:prstGeom>
+          <a:noFill/>
+          <a:ln/>
+        </p:spPr>
+        <p:txBody>
+          <a:bodyPr wrap="none" rtlCol="0" anchor="t"/>
+          <a:lstStyle/>
+          <a:p>
+            <a:pPr marL="0" indent="0" algn="l">
+              <a:lnSpc>
+                <a:spcPts val="2734"/>
+              </a:lnSpc>
+              <a:buNone/>
+            </a:pPr>
+            <a:r>
+              <a:rPr lang="en-US" sz="2800" dirty="0">
+                <a:solidFill>
+                  <a:srgbClr val="EBECEF"/>
+                </a:solidFill>
+                <a:latin typeface="Fraunces" pitchFamily="34" charset="0"/>
+                <a:ea typeface="Fraunces" pitchFamily="34" charset="-122"/>
+                <a:cs typeface="Fraunces" pitchFamily="34" charset="-120"/>
+              </a:rPr>
+              <a:t>Identificar dependência</a:t>
+            </a:r>
+            <a:endParaRPr lang="en-US" sz="2800" dirty="0"/>
+          </a:p>
+        </p:txBody>
+      </p:sp>
+      <p:sp>
+        <p:nvSpPr>
+          <p:cNvPr id="11" name="Text 9"/>
+          <p:cNvSpPr/>
+          <p:nvPr/>
+        </p:nvSpPr>
+        <p:spPr>
+          <a:xfrm>
+            <a:off x="8537258" y="4359116"/>
+            <a:ext cx="4055150" cy="710803"/>
+          </a:xfrm>
+          <a:prstGeom prst="rect">
+            <a:avLst/>
+          </a:prstGeom>
+          <a:noFill/>
+          <a:ln/>
+        </p:spPr>
+        <p:txBody>
+          <a:bodyPr wrap="square" rtlCol="0" anchor="t"/>
+          <a:lstStyle/>
+          <a:p>
+            <a:pPr marL="0" indent="0" algn="l">
+              <a:lnSpc>
+                <a:spcPts val="2799"/>
+              </a:lnSpc>
+              <a:buNone/>
+            </a:pPr>
+            <a:r>
+              <a:rPr lang="en-US" sz="2000" dirty="0">
+                <a:solidFill>
+                  <a:srgbClr val="EBECEF"/>
+                </a:solidFill>
+                <a:latin typeface="Epilogue" pitchFamily="34" charset="0"/>
+                <a:ea typeface="Epilogue" pitchFamily="34" charset="-122"/>
+                <a:cs typeface="Epilogue" pitchFamily="34" charset="-120"/>
+              </a:rPr>
+              <a:t>Identificar as dependências entre as classes do software.</a:t>
+            </a:r>
+            <a:endParaRPr lang="en-US" sz="2000" dirty="0"/>
+          </a:p>
+        </p:txBody>
+      </p:sp>
+      <p:sp>
+        <p:nvSpPr>
+          <p:cNvPr id="12" name="Shape 10"/>
+          <p:cNvSpPr/>
+          <p:nvPr/>
+        </p:nvSpPr>
+        <p:spPr>
+          <a:xfrm>
+            <a:off x="6287631" y="5079742"/>
+            <a:ext cx="777597" cy="44410"/>
+          </a:xfrm>
+          <a:prstGeom prst="rect">
+            <a:avLst/>
+          </a:prstGeom>
+          <a:solidFill>
+            <a:srgbClr val="303B69"/>
+          </a:solidFill>
+          <a:ln/>
+        </p:spPr>
+        <p:txBody>
+          <a:bodyPr/>
+          <a:lstStyle/>
+          <a:p>
+            <a:endParaRPr lang="pt-BR"/>
+          </a:p>
+        </p:txBody>
+      </p:sp>
+      <p:sp>
+        <p:nvSpPr>
+          <p:cNvPr id="13" name="Shape 11"/>
+          <p:cNvSpPr/>
+          <p:nvPr/>
+        </p:nvSpPr>
+        <p:spPr>
+          <a:xfrm>
+            <a:off x="7065228" y="4852035"/>
+            <a:ext cx="499943" cy="499943"/>
+          </a:xfrm>
+          <a:prstGeom prst="roundRect">
+            <a:avLst>
+              <a:gd name="adj" fmla="val 20000"/>
+            </a:avLst>
+          </a:prstGeom>
+          <a:solidFill>
+            <a:srgbClr val="283157"/>
+          </a:solidFill>
+          <a:ln w="13811">
+            <a:solidFill>
+              <a:srgbClr val="303B69"/>
+            </a:solidFill>
+            <a:prstDash val="solid"/>
+          </a:ln>
+        </p:spPr>
+        <p:txBody>
+          <a:bodyPr/>
+          <a:lstStyle/>
+          <a:p>
+            <a:endParaRPr lang="pt-BR"/>
+          </a:p>
+        </p:txBody>
+      </p:sp>
+      <p:sp>
+        <p:nvSpPr>
+          <p:cNvPr id="14" name="Text 12"/>
+          <p:cNvSpPr/>
+          <p:nvPr/>
+        </p:nvSpPr>
+        <p:spPr>
+          <a:xfrm>
+            <a:off x="7212270" y="4893707"/>
+            <a:ext cx="205740" cy="416481"/>
+          </a:xfrm>
+          <a:prstGeom prst="rect">
+            <a:avLst/>
+          </a:prstGeom>
+          <a:noFill/>
+          <a:ln/>
+        </p:spPr>
+        <p:txBody>
+          <a:bodyPr wrap="none" rtlCol="0" anchor="t"/>
+          <a:lstStyle/>
+          <a:p>
+            <a:pPr marL="0" indent="0" algn="ctr">
+              <a:lnSpc>
+                <a:spcPts val="3281"/>
+              </a:lnSpc>
+              <a:buNone/>
+            </a:pPr>
+            <a:r>
+              <a:rPr lang="en-US" sz="2624" dirty="0">
+                <a:solidFill>
+                  <a:srgbClr val="EBECEF"/>
+                </a:solidFill>
+                <a:latin typeface="Fraunces" pitchFamily="34" charset="0"/>
+                <a:ea typeface="Fraunces" pitchFamily="34" charset="-122"/>
+                <a:cs typeface="Fraunces" pitchFamily="34" charset="-120"/>
+              </a:rPr>
+              <a:t>2</a:t>
+            </a:r>
+            <a:endParaRPr lang="en-US" sz="2624" dirty="0"/>
+          </a:p>
+        </p:txBody>
+      </p:sp>
+      <p:sp>
+        <p:nvSpPr>
+          <p:cNvPr id="15" name="Text 13"/>
+          <p:cNvSpPr/>
+          <p:nvPr/>
+        </p:nvSpPr>
+        <p:spPr>
+          <a:xfrm>
+            <a:off x="3871198" y="4900613"/>
+            <a:ext cx="2221944" cy="347186"/>
+          </a:xfrm>
+          <a:prstGeom prst="rect">
+            <a:avLst/>
+          </a:prstGeom>
+          <a:noFill/>
+          <a:ln/>
+        </p:spPr>
+        <p:txBody>
+          <a:bodyPr wrap="none" rtlCol="0" anchor="t"/>
+          <a:lstStyle/>
+          <a:p>
+            <a:pPr marL="0" indent="0" algn="r">
+              <a:lnSpc>
+                <a:spcPts val="2734"/>
+              </a:lnSpc>
+              <a:buNone/>
+            </a:pPr>
+            <a:r>
+              <a:rPr lang="en-US" sz="2800" dirty="0">
+                <a:solidFill>
+                  <a:srgbClr val="EBECEF"/>
+                </a:solidFill>
+                <a:latin typeface="Fraunces" pitchFamily="34" charset="0"/>
+                <a:ea typeface="Fraunces" pitchFamily="34" charset="-122"/>
+                <a:cs typeface="Fraunces" pitchFamily="34" charset="-120"/>
+              </a:rPr>
+              <a:t>Criar abstrações</a:t>
+            </a:r>
+            <a:endParaRPr lang="en-US" sz="2800" dirty="0"/>
+          </a:p>
+        </p:txBody>
+      </p:sp>
+      <p:sp>
+        <p:nvSpPr>
+          <p:cNvPr id="16" name="Text 14"/>
+          <p:cNvSpPr/>
+          <p:nvPr/>
+        </p:nvSpPr>
+        <p:spPr>
+          <a:xfrm>
+            <a:off x="2037993" y="5469969"/>
+            <a:ext cx="4055150" cy="710803"/>
+          </a:xfrm>
+          <a:prstGeom prst="rect">
+            <a:avLst/>
+          </a:prstGeom>
+          <a:noFill/>
+          <a:ln/>
+        </p:spPr>
+        <p:txBody>
+          <a:bodyPr wrap="square" rtlCol="0" anchor="t"/>
+          <a:lstStyle/>
+          <a:p>
+            <a:pPr marL="0" indent="0" algn="r">
+              <a:lnSpc>
+                <a:spcPts val="2799"/>
+              </a:lnSpc>
+              <a:buNone/>
+            </a:pPr>
+            <a:r>
+              <a:rPr lang="en-US" sz="2000" dirty="0">
+                <a:solidFill>
+                  <a:srgbClr val="EBECEF"/>
+                </a:solidFill>
+                <a:latin typeface="Epilogue" pitchFamily="34" charset="0"/>
+                <a:ea typeface="Epilogue" pitchFamily="34" charset="-122"/>
+                <a:cs typeface="Epilogue" pitchFamily="34" charset="-120"/>
+              </a:rPr>
+              <a:t>Criar as abstrações necessárias para desacoplar as dependências.</a:t>
+            </a:r>
+            <a:endParaRPr lang="en-US" sz="2000" dirty="0"/>
+          </a:p>
+        </p:txBody>
+      </p:sp>
+      <p:sp>
+        <p:nvSpPr>
+          <p:cNvPr id="17" name="Shape 15"/>
+          <p:cNvSpPr/>
+          <p:nvPr/>
+        </p:nvSpPr>
+        <p:spPr>
+          <a:xfrm>
+            <a:off x="7565172" y="6079510"/>
+            <a:ext cx="777597" cy="44410"/>
+          </a:xfrm>
+          <a:prstGeom prst="rect">
+            <a:avLst/>
+          </a:prstGeom>
+          <a:solidFill>
+            <a:srgbClr val="303B69"/>
+          </a:solidFill>
+          <a:ln/>
+        </p:spPr>
+        <p:txBody>
+          <a:bodyPr/>
+          <a:lstStyle/>
+          <a:p>
+            <a:endParaRPr lang="pt-BR"/>
+          </a:p>
+        </p:txBody>
+      </p:sp>
+      <p:sp>
+        <p:nvSpPr>
+          <p:cNvPr id="18" name="Shape 16"/>
+          <p:cNvSpPr/>
+          <p:nvPr/>
+        </p:nvSpPr>
+        <p:spPr>
+          <a:xfrm>
+            <a:off x="7065228" y="5851803"/>
+            <a:ext cx="499943" cy="499943"/>
+          </a:xfrm>
+          <a:prstGeom prst="roundRect">
+            <a:avLst>
+              <a:gd name="adj" fmla="val 20000"/>
+            </a:avLst>
+          </a:prstGeom>
+          <a:solidFill>
+            <a:srgbClr val="283157"/>
+          </a:solidFill>
+          <a:ln w="13811">
+            <a:solidFill>
+              <a:srgbClr val="303B69"/>
+            </a:solidFill>
+            <a:prstDash val="solid"/>
+          </a:ln>
+        </p:spPr>
+        <p:txBody>
+          <a:bodyPr/>
+          <a:lstStyle/>
+          <a:p>
+            <a:endParaRPr lang="pt-BR"/>
+          </a:p>
+        </p:txBody>
+      </p:sp>
+      <p:sp>
+        <p:nvSpPr>
+          <p:cNvPr id="19" name="Text 17"/>
+          <p:cNvSpPr/>
+          <p:nvPr/>
+        </p:nvSpPr>
+        <p:spPr>
+          <a:xfrm>
+            <a:off x="7223700" y="5893475"/>
+            <a:ext cx="182880" cy="416481"/>
+          </a:xfrm>
+          <a:prstGeom prst="rect">
+            <a:avLst/>
+          </a:prstGeom>
+          <a:noFill/>
+          <a:ln/>
+        </p:spPr>
+        <p:txBody>
+          <a:bodyPr wrap="none" rtlCol="0" anchor="t"/>
+          <a:lstStyle/>
+          <a:p>
+            <a:pPr marL="0" indent="0" algn="ctr">
+              <a:lnSpc>
+                <a:spcPts val="3281"/>
+              </a:lnSpc>
+              <a:buNone/>
+            </a:pPr>
+            <a:r>
+              <a:rPr lang="en-US" sz="2624" dirty="0">
+                <a:solidFill>
+                  <a:srgbClr val="EBECEF"/>
+                </a:solidFill>
+                <a:latin typeface="Fraunces" pitchFamily="34" charset="0"/>
+                <a:ea typeface="Fraunces" pitchFamily="34" charset="-122"/>
+                <a:cs typeface="Fraunces" pitchFamily="34" charset="-120"/>
+              </a:rPr>
+              <a:t>3</a:t>
+            </a:r>
+            <a:endParaRPr lang="en-US" sz="2624" dirty="0"/>
+          </a:p>
+        </p:txBody>
+      </p:sp>
+      <p:sp>
+        <p:nvSpPr>
+          <p:cNvPr id="20" name="Text 18"/>
+          <p:cNvSpPr/>
+          <p:nvPr/>
+        </p:nvSpPr>
+        <p:spPr>
+          <a:xfrm>
+            <a:off x="8537258" y="5900380"/>
+            <a:ext cx="2377440" cy="347186"/>
+          </a:xfrm>
+          <a:prstGeom prst="rect">
+            <a:avLst/>
+          </a:prstGeom>
+          <a:noFill/>
+          <a:ln/>
+        </p:spPr>
+        <p:txBody>
+          <a:bodyPr wrap="none" rtlCol="0" anchor="t"/>
+          <a:lstStyle/>
+          <a:p>
+            <a:pPr marL="0" indent="0" algn="l">
+              <a:lnSpc>
+                <a:spcPts val="2734"/>
+              </a:lnSpc>
+              <a:buNone/>
+            </a:pPr>
+            <a:r>
+              <a:rPr lang="en-US" sz="2800" dirty="0">
+                <a:solidFill>
+                  <a:srgbClr val="EBECEF"/>
+                </a:solidFill>
+                <a:latin typeface="Fraunces" pitchFamily="34" charset="0"/>
+                <a:ea typeface="Fraunces" pitchFamily="34" charset="-122"/>
+                <a:cs typeface="Fraunces" pitchFamily="34" charset="-120"/>
+              </a:rPr>
+              <a:t>Inserir abstrações</a:t>
+            </a:r>
+            <a:endParaRPr lang="en-US" sz="2800" dirty="0"/>
+          </a:p>
+        </p:txBody>
+      </p:sp>
+      <p:sp>
+        <p:nvSpPr>
+          <p:cNvPr id="21" name="Text 19"/>
+          <p:cNvSpPr/>
+          <p:nvPr/>
+        </p:nvSpPr>
+        <p:spPr>
+          <a:xfrm>
+            <a:off x="8537258" y="6469737"/>
+            <a:ext cx="4055150" cy="710803"/>
+          </a:xfrm>
+          <a:prstGeom prst="rect">
+            <a:avLst/>
+          </a:prstGeom>
+          <a:noFill/>
+          <a:ln/>
+        </p:spPr>
+        <p:txBody>
+          <a:bodyPr wrap="square" rtlCol="0" anchor="t"/>
+          <a:lstStyle/>
+          <a:p>
+            <a:pPr marL="0" indent="0" algn="l">
+              <a:lnSpc>
+                <a:spcPts val="2799"/>
+              </a:lnSpc>
+              <a:buNone/>
+            </a:pPr>
+            <a:r>
+              <a:rPr lang="en-US" sz="2000" dirty="0">
+                <a:solidFill>
+                  <a:srgbClr val="EBECEF"/>
+                </a:solidFill>
+                <a:latin typeface="Epilogue" pitchFamily="34" charset="0"/>
+                <a:ea typeface="Epilogue" pitchFamily="34" charset="-122"/>
+                <a:cs typeface="Epilogue" pitchFamily="34" charset="-120"/>
+              </a:rPr>
+              <a:t>Inserir as abstrações nos módulos dependentes.</a:t>
+            </a:r>
+            <a:endParaRPr lang="en-US" sz="2000" dirty="0"/>
+          </a:p>
+        </p:txBody>
+      </p:sp>
+    </p:spTree>
+  </p:cSld>
+  <p:clrMapOvr>
+    <a:masterClrMapping/>
+  </p:clrMapOvr>
+</p:sld>
+</file>
+
+<file path=ppt/slides/slide5.xml><?xml version="1.0" encoding="utf-8"?>
+<p:sld xmlns:a="http://schemas.openxmlformats.org/drawingml/2006/main" xmlns:r="http://schemas.openxmlformats.org/officeDocument/2006/relationships" xmlns:p="http://schemas.openxmlformats.org/presentationml/2006/main">
   <p:cSld name="Slide 5">
     <p:spTree>
       <p:nvGrpSpPr>
@@ -2850,9 +3728,9 @@
 </p:sld>
 </file>
 
-<file path=ppt/slides/slide5.xml><?xml version="1.0" encoding="utf-8"?>
+<file path=ppt/slides/slide6.xml><?xml version="1.0" encoding="utf-8"?>
 <p:sld xmlns:a="http://schemas.openxmlformats.org/drawingml/2006/main" xmlns:r="http://schemas.openxmlformats.org/officeDocument/2006/relationships" xmlns:p="http://schemas.openxmlformats.org/presentationml/2006/main">
-  <p:cSld name="Slide 7">
+  <p:cSld>
     <p:spTree>
       <p:nvGrpSpPr>
         <p:cNvPr id="1" name=""/>
@@ -2890,7 +3768,7 @@
           <a:bodyPr/>
           <a:lstStyle/>
           <a:p>
-            <a:endParaRPr lang="pt-BR"/>
+            <a:endParaRPr lang="pt-BR" dirty="0"/>
           </a:p>
         </p:txBody>
       </p:sp>
@@ -2911,7 +3789,7 @@
           <a:solidFill>
             <a:srgbClr val="080E26"/>
           </a:solidFill>
-          <a:ln w="13811">
+          <a:ln w="11192">
             <a:solidFill>
               <a:srgbClr val="565151"/>
             </a:solidFill>
@@ -2922,7 +3800,7 @@
           <a:bodyPr/>
           <a:lstStyle/>
           <a:p>
-            <a:endParaRPr lang="pt-BR"/>
+            <a:endParaRPr lang="pt-BR" sz="2000" dirty="0"/>
           </a:p>
         </p:txBody>
       </p:sp>
@@ -2934,8 +3812,8 @@
         </p:nvSpPr>
         <p:spPr>
           <a:xfrm>
-            <a:off x="2037993" y="773787"/>
-            <a:ext cx="10554414" cy="1388745"/>
+            <a:off x="1929765" y="494943"/>
+            <a:ext cx="10770751" cy="1121807"/>
           </a:xfrm>
           <a:prstGeom prst="rect">
             <a:avLst/>
@@ -2949,12 +3827,12 @@
           <a:p>
             <a:pPr marL="0" indent="0">
               <a:lnSpc>
-                <a:spcPts val="5468"/>
-              </a:lnSpc>
-              <a:buNone/>
-            </a:pPr>
-            <a:r>
-              <a:rPr lang="en-US" sz="4374" dirty="0">
+                <a:spcPts val="4417"/>
+              </a:lnSpc>
+              <a:buNone/>
+            </a:pPr>
+            <a:r>
+              <a:rPr lang="en-US" sz="3534" dirty="0">
                 <a:solidFill>
                   <a:srgbClr val="FFFFFF"/>
                 </a:solidFill>
@@ -2962,51 +3840,36 @@
                 <a:ea typeface="Fraunces" pitchFamily="34" charset="-122"/>
                 <a:cs typeface="Fraunces" pitchFamily="34" charset="-120"/>
               </a:rPr>
-              <a:t>Como aplicar o Princípio de Inversão de Dependência em projetos</a:t>
-            </a:r>
-            <a:endParaRPr lang="en-US" sz="4374" dirty="0"/>
-          </a:p>
-        </p:txBody>
-      </p:sp>
-      <p:sp>
-        <p:nvSpPr>
-          <p:cNvPr id="5" name="Text 3"/>
-          <p:cNvSpPr/>
-          <p:nvPr/>
-        </p:nvSpPr>
-        <p:spPr>
-          <a:xfrm>
-            <a:off x="2037993" y="2606873"/>
-            <a:ext cx="10554414" cy="710803"/>
-          </a:xfrm>
-          <a:prstGeom prst="rect">
-            <a:avLst/>
-          </a:prstGeom>
-          <a:noFill/>
-          <a:ln/>
-        </p:spPr>
-        <p:txBody>
-          <a:bodyPr wrap="square" rtlCol="0" anchor="t"/>
-          <a:lstStyle/>
-          <a:p>
-            <a:pPr marL="0" indent="0">
-              <a:lnSpc>
-                <a:spcPts val="2799"/>
-              </a:lnSpc>
-              <a:buNone/>
-            </a:pPr>
-            <a:r>
-              <a:rPr lang="en-US" sz="2000" dirty="0">
-                <a:solidFill>
-                  <a:srgbClr val="EBECEF"/>
-                </a:solidFill>
-                <a:latin typeface="Epilogue" pitchFamily="34" charset="0"/>
-                <a:ea typeface="Epilogue" pitchFamily="34" charset="-122"/>
-                <a:cs typeface="Epilogue" pitchFamily="34" charset="-120"/>
-              </a:rPr>
-              <a:t>Para aplicar o Princípio de Inversão de Dependência em projetos, é necessário seguir algumas etapas:</a:t>
-            </a:r>
-            <a:endParaRPr lang="en-US" sz="2000" dirty="0"/>
+              <a:t>Como implementar a injeção de dependência em um projeto</a:t>
+            </a:r>
+            <a:endParaRPr lang="en-US" sz="3534" dirty="0"/>
+          </a:p>
+        </p:txBody>
+      </p:sp>
+      <p:sp>
+        <p:nvSpPr>
+          <p:cNvPr id="5" name="Shape 3"/>
+          <p:cNvSpPr/>
+          <p:nvPr/>
+        </p:nvSpPr>
+        <p:spPr>
+          <a:xfrm>
+            <a:off x="7297222" y="1975723"/>
+            <a:ext cx="35838" cy="5758934"/>
+          </a:xfrm>
+          <a:prstGeom prst="rect">
+            <a:avLst/>
+          </a:prstGeom>
+          <a:solidFill>
+            <a:srgbClr val="303B69"/>
+          </a:solidFill>
+          <a:ln/>
+        </p:spPr>
+        <p:txBody>
+          <a:bodyPr/>
+          <a:lstStyle/>
+          <a:p>
+            <a:endParaRPr lang="pt-BR" dirty="0"/>
           </a:p>
         </p:txBody>
       </p:sp>
@@ -3018,8 +3881,8 @@
         </p:nvSpPr>
         <p:spPr>
           <a:xfrm>
-            <a:off x="7293054" y="3567589"/>
-            <a:ext cx="44410" cy="3888224"/>
+            <a:off x="7517011" y="2165437"/>
+            <a:ext cx="628293" cy="35838"/>
           </a:xfrm>
           <a:prstGeom prst="rect">
             <a:avLst/>
@@ -3033,7 +3896,7 @@
           <a:bodyPr/>
           <a:lstStyle/>
           <a:p>
-            <a:endParaRPr lang="pt-BR"/>
+            <a:endParaRPr lang="pt-BR" dirty="0"/>
           </a:p>
         </p:txBody>
       </p:sp>
@@ -3045,45 +3908,18 @@
         </p:nvSpPr>
         <p:spPr>
           <a:xfrm>
-            <a:off x="7565172" y="3968889"/>
-            <a:ext cx="777597" cy="44410"/>
-          </a:xfrm>
-          <a:prstGeom prst="rect">
-            <a:avLst/>
-          </a:prstGeom>
-          <a:solidFill>
-            <a:srgbClr val="303B69"/>
-          </a:solidFill>
-          <a:ln/>
-        </p:spPr>
-        <p:txBody>
-          <a:bodyPr/>
-          <a:lstStyle/>
-          <a:p>
-            <a:endParaRPr lang="pt-BR"/>
-          </a:p>
-        </p:txBody>
-      </p:sp>
-      <p:sp>
-        <p:nvSpPr>
-          <p:cNvPr id="8" name="Shape 6"/>
-          <p:cNvSpPr/>
-          <p:nvPr/>
-        </p:nvSpPr>
-        <p:spPr>
-          <a:xfrm>
-            <a:off x="7065228" y="3741182"/>
-            <a:ext cx="499943" cy="499943"/>
+            <a:off x="7113151" y="1981545"/>
+            <a:ext cx="403860" cy="403860"/>
           </a:xfrm>
           <a:prstGeom prst="roundRect">
             <a:avLst>
-              <a:gd name="adj" fmla="val 20000"/>
+              <a:gd name="adj" fmla="val 20002"/>
             </a:avLst>
           </a:prstGeom>
           <a:solidFill>
             <a:srgbClr val="283157"/>
           </a:solidFill>
-          <a:ln w="13811">
+          <a:ln w="11192">
             <a:solidFill>
               <a:srgbClr val="303B69"/>
             </a:solidFill>
@@ -3094,7 +3930,49 @@
           <a:bodyPr/>
           <a:lstStyle/>
           <a:p>
-            <a:endParaRPr lang="pt-BR"/>
+            <a:endParaRPr lang="pt-BR" dirty="0"/>
+          </a:p>
+        </p:txBody>
+      </p:sp>
+      <p:sp>
+        <p:nvSpPr>
+          <p:cNvPr id="8" name="Text 6"/>
+          <p:cNvSpPr/>
+          <p:nvPr/>
+        </p:nvSpPr>
+        <p:spPr>
+          <a:xfrm>
+            <a:off x="7254121" y="2015120"/>
+            <a:ext cx="121920" cy="336590"/>
+          </a:xfrm>
+          <a:prstGeom prst="rect">
+            <a:avLst/>
+          </a:prstGeom>
+          <a:noFill/>
+          <a:ln/>
+        </p:spPr>
+        <p:txBody>
+          <a:bodyPr wrap="none" rtlCol="0" anchor="t"/>
+          <a:lstStyle/>
+          <a:p>
+            <a:pPr marL="0" indent="0" algn="ctr">
+              <a:lnSpc>
+                <a:spcPts val="2650"/>
+              </a:lnSpc>
+              <a:buNone/>
+            </a:pPr>
+            <a:r>
+              <a:rPr lang="en-US" sz="2120" dirty="0">
+                <a:solidFill>
+                  <a:srgbClr val="EBECEF"/>
+                </a:solidFill>
+                <a:latin typeface="Fraunces" pitchFamily="34" charset="0"/>
+                <a:ea typeface="Fraunces" pitchFamily="34" charset="-122"/>
+                <a:cs typeface="Fraunces" pitchFamily="34" charset="-120"/>
+              </a:rPr>
+              <a:t>1</a:t>
+            </a:r>
+            <a:endParaRPr lang="en-US" sz="2120" dirty="0"/>
           </a:p>
         </p:txBody>
       </p:sp>
@@ -3106,8 +3984,8 @@
         </p:nvSpPr>
         <p:spPr>
           <a:xfrm>
-            <a:off x="7238940" y="3782854"/>
-            <a:ext cx="152400" cy="416481"/>
+            <a:off x="8302346" y="2058221"/>
+            <a:ext cx="4682133" cy="286107"/>
           </a:xfrm>
           <a:prstGeom prst="rect">
             <a:avLst/>
@@ -3119,24 +3997,24 @@
           <a:bodyPr wrap="none" rtlCol="0" anchor="t"/>
           <a:lstStyle/>
           <a:p>
-            <a:pPr marL="0" indent="0" algn="ctr">
-              <a:lnSpc>
-                <a:spcPts val="3281"/>
-              </a:lnSpc>
-              <a:buNone/>
-            </a:pPr>
-            <a:r>
-              <a:rPr lang="en-US" sz="2624" dirty="0">
-                <a:solidFill>
-                  <a:srgbClr val="EBECEF"/>
-                </a:solidFill>
-                <a:latin typeface="Fraunces" pitchFamily="34" charset="0"/>
-                <a:ea typeface="Fraunces" pitchFamily="34" charset="-122"/>
-                <a:cs typeface="Fraunces" pitchFamily="34" charset="-120"/>
-              </a:rPr>
-              <a:t>1</a:t>
-            </a:r>
-            <a:endParaRPr lang="en-US" sz="2624" dirty="0"/>
+            <a:pPr marL="0" indent="0" algn="l">
+              <a:lnSpc>
+                <a:spcPts val="2209"/>
+              </a:lnSpc>
+              <a:buNone/>
+            </a:pPr>
+            <a:r>
+              <a:rPr lang="en-US" sz="2800" dirty="0">
+                <a:solidFill>
+                  <a:srgbClr val="EBECEF"/>
+                </a:solidFill>
+                <a:latin typeface="Fraunces" pitchFamily="34" charset="0"/>
+                <a:ea typeface="Fraunces" pitchFamily="34" charset="-122"/>
+                <a:cs typeface="Fraunces" pitchFamily="34" charset="-120"/>
+              </a:rPr>
+              <a:t>Identifique suas dependências</a:t>
+            </a:r>
+            <a:endParaRPr lang="en-US" sz="2800" dirty="0"/>
           </a:p>
         </p:txBody>
       </p:sp>
@@ -3148,8 +4026,8 @@
         </p:nvSpPr>
         <p:spPr>
           <a:xfrm>
-            <a:off x="8537258" y="3789759"/>
-            <a:ext cx="3131820" cy="347186"/>
+            <a:off x="8302347" y="2517701"/>
+            <a:ext cx="5888117" cy="1597099"/>
           </a:xfrm>
           <a:prstGeom prst="rect">
             <a:avLst/>
@@ -3158,54 +4036,12 @@
           <a:ln/>
         </p:spPr>
         <p:txBody>
-          <a:bodyPr wrap="none" rtlCol="0" anchor="t"/>
+          <a:bodyPr wrap="square" rtlCol="0" anchor="t"/>
           <a:lstStyle/>
           <a:p>
             <a:pPr marL="0" indent="0" algn="l">
               <a:lnSpc>
-                <a:spcPts val="2734"/>
-              </a:lnSpc>
-              <a:buNone/>
-            </a:pPr>
-            <a:r>
-              <a:rPr lang="en-US" sz="2800" dirty="0">
-                <a:solidFill>
-                  <a:srgbClr val="EBECEF"/>
-                </a:solidFill>
-                <a:latin typeface="Fraunces" pitchFamily="34" charset="0"/>
-                <a:ea typeface="Fraunces" pitchFamily="34" charset="-122"/>
-                <a:cs typeface="Fraunces" pitchFamily="34" charset="-120"/>
-              </a:rPr>
-              <a:t>Identificar dependência</a:t>
-            </a:r>
-            <a:endParaRPr lang="en-US" sz="2800" dirty="0"/>
-          </a:p>
-        </p:txBody>
-      </p:sp>
-      <p:sp>
-        <p:nvSpPr>
-          <p:cNvPr id="11" name="Text 9"/>
-          <p:cNvSpPr/>
-          <p:nvPr/>
-        </p:nvSpPr>
-        <p:spPr>
-          <a:xfrm>
-            <a:off x="8537258" y="4359116"/>
-            <a:ext cx="4055150" cy="710803"/>
-          </a:xfrm>
-          <a:prstGeom prst="rect">
-            <a:avLst/>
-          </a:prstGeom>
-          <a:noFill/>
-          <a:ln/>
-        </p:spPr>
-        <p:txBody>
-          <a:bodyPr wrap="square" rtlCol="0" anchor="t"/>
-          <a:lstStyle/>
-          <a:p>
-            <a:pPr marL="0" indent="0" algn="l">
-              <a:lnSpc>
-                <a:spcPts val="2799"/>
+                <a:spcPts val="2262"/>
               </a:lnSpc>
               <a:buNone/>
             </a:pPr>
@@ -3218,7 +4054,7 @@
                 <a:ea typeface="Epilogue" pitchFamily="34" charset="-122"/>
                 <a:cs typeface="Epilogue" pitchFamily="34" charset="-120"/>
               </a:rPr>
-              <a:t>Identificar as dependências entre as classes do software.</a:t>
+              <a:t>O primeiro passo para implementar a injeção de dependência é identificar as dependências que existem em seu código. Se quiser torná-las injetáveis, você deve primeiro extrair a interface que cada dependência implementa.</a:t>
             </a:r>
             <a:endParaRPr lang="en-US" sz="2000" dirty="0"/>
           </a:p>
@@ -3226,51 +4062,51 @@
       </p:sp>
       <p:sp>
         <p:nvSpPr>
+          <p:cNvPr id="11" name="Shape 9"/>
+          <p:cNvSpPr/>
+          <p:nvPr/>
+        </p:nvSpPr>
+        <p:spPr>
+          <a:xfrm>
+            <a:off x="6484858" y="3197245"/>
+            <a:ext cx="628293" cy="35838"/>
+          </a:xfrm>
+          <a:prstGeom prst="rect">
+            <a:avLst/>
+          </a:prstGeom>
+          <a:solidFill>
+            <a:srgbClr val="303B69"/>
+          </a:solidFill>
+          <a:ln/>
+        </p:spPr>
+        <p:txBody>
+          <a:bodyPr/>
+          <a:lstStyle/>
+          <a:p>
+            <a:endParaRPr lang="pt-BR" dirty="0"/>
+          </a:p>
+        </p:txBody>
+      </p:sp>
+      <p:sp>
+        <p:nvSpPr>
           <p:cNvPr id="12" name="Shape 10"/>
           <p:cNvSpPr/>
           <p:nvPr/>
         </p:nvSpPr>
         <p:spPr>
           <a:xfrm>
-            <a:off x="6287631" y="5079742"/>
-            <a:ext cx="777597" cy="44410"/>
-          </a:xfrm>
-          <a:prstGeom prst="rect">
-            <a:avLst/>
-          </a:prstGeom>
-          <a:solidFill>
-            <a:srgbClr val="303B69"/>
-          </a:solidFill>
-          <a:ln/>
-        </p:spPr>
-        <p:txBody>
-          <a:bodyPr/>
-          <a:lstStyle/>
-          <a:p>
-            <a:endParaRPr lang="pt-BR"/>
-          </a:p>
-        </p:txBody>
-      </p:sp>
-      <p:sp>
-        <p:nvSpPr>
-          <p:cNvPr id="13" name="Shape 11"/>
-          <p:cNvSpPr/>
-          <p:nvPr/>
-        </p:nvSpPr>
-        <p:spPr>
-          <a:xfrm>
-            <a:off x="7065228" y="4852035"/>
-            <a:ext cx="499943" cy="499943"/>
+            <a:off x="7113151" y="3013353"/>
+            <a:ext cx="403860" cy="403860"/>
           </a:xfrm>
           <a:prstGeom prst="roundRect">
             <a:avLst>
-              <a:gd name="adj" fmla="val 20000"/>
+              <a:gd name="adj" fmla="val 20002"/>
             </a:avLst>
           </a:prstGeom>
           <a:solidFill>
             <a:srgbClr val="283157"/>
           </a:solidFill>
-          <a:ln w="13811">
+          <a:ln w="11192">
             <a:solidFill>
               <a:srgbClr val="303B69"/>
             </a:solidFill>
@@ -3281,7 +4117,49 @@
           <a:bodyPr/>
           <a:lstStyle/>
           <a:p>
-            <a:endParaRPr lang="pt-BR"/>
+            <a:endParaRPr lang="pt-BR" dirty="0"/>
+          </a:p>
+        </p:txBody>
+      </p:sp>
+      <p:sp>
+        <p:nvSpPr>
+          <p:cNvPr id="13" name="Text 11"/>
+          <p:cNvSpPr/>
+          <p:nvPr/>
+        </p:nvSpPr>
+        <p:spPr>
+          <a:xfrm>
+            <a:off x="7235071" y="3046928"/>
+            <a:ext cx="160020" cy="336590"/>
+          </a:xfrm>
+          <a:prstGeom prst="rect">
+            <a:avLst/>
+          </a:prstGeom>
+          <a:noFill/>
+          <a:ln/>
+        </p:spPr>
+        <p:txBody>
+          <a:bodyPr wrap="none" rtlCol="0" anchor="t"/>
+          <a:lstStyle/>
+          <a:p>
+            <a:pPr marL="0" indent="0" algn="ctr">
+              <a:lnSpc>
+                <a:spcPts val="2650"/>
+              </a:lnSpc>
+              <a:buNone/>
+            </a:pPr>
+            <a:r>
+              <a:rPr lang="en-US" sz="2120" dirty="0">
+                <a:solidFill>
+                  <a:srgbClr val="EBECEF"/>
+                </a:solidFill>
+                <a:latin typeface="Fraunces" pitchFamily="34" charset="0"/>
+                <a:ea typeface="Fraunces" pitchFamily="34" charset="-122"/>
+                <a:cs typeface="Fraunces" pitchFamily="34" charset="-120"/>
+              </a:rPr>
+              <a:t>2</a:t>
+            </a:r>
+            <a:endParaRPr lang="en-US" sz="2120" dirty="0"/>
           </a:p>
         </p:txBody>
       </p:sp>
@@ -3293,8 +4171,8 @@
         </p:nvSpPr>
         <p:spPr>
           <a:xfrm>
-            <a:off x="7212270" y="4893707"/>
-            <a:ext cx="205740" cy="416481"/>
+            <a:off x="439936" y="2926911"/>
+            <a:ext cx="5887879" cy="686635"/>
           </a:xfrm>
           <a:prstGeom prst="rect">
             <a:avLst/>
@@ -3303,27 +4181,80 @@
           <a:ln/>
         </p:spPr>
         <p:txBody>
-          <a:bodyPr wrap="none" rtlCol="0" anchor="t"/>
-          <a:lstStyle/>
-          <a:p>
-            <a:pPr marL="0" indent="0" algn="ctr">
-              <a:lnSpc>
-                <a:spcPts val="3281"/>
-              </a:lnSpc>
-              <a:buNone/>
-            </a:pPr>
-            <a:r>
-              <a:rPr lang="en-US" sz="2624" dirty="0">
-                <a:solidFill>
-                  <a:srgbClr val="EBECEF"/>
-                </a:solidFill>
-                <a:latin typeface="Fraunces" pitchFamily="34" charset="0"/>
-                <a:ea typeface="Fraunces" pitchFamily="34" charset="-122"/>
-                <a:cs typeface="Fraunces" pitchFamily="34" charset="-120"/>
-              </a:rPr>
-              <a:t>2</a:t>
-            </a:r>
-            <a:endParaRPr lang="en-US" sz="2624" dirty="0"/>
+          <a:bodyPr wrap="square" rtlCol="0" anchor="t"/>
+          <a:lstStyle/>
+          <a:p>
+            <a:pPr marL="0" indent="0" algn="r">
+              <a:lnSpc>
+                <a:spcPts val="2209"/>
+              </a:lnSpc>
+              <a:buNone/>
+            </a:pPr>
+            <a:r>
+              <a:rPr lang="en-US" sz="2800" dirty="0" err="1">
+                <a:solidFill>
+                  <a:srgbClr val="EBECEF"/>
+                </a:solidFill>
+                <a:latin typeface="Fraunces" pitchFamily="34" charset="0"/>
+                <a:ea typeface="Fraunces" pitchFamily="34" charset="-122"/>
+                <a:cs typeface="Fraunces" pitchFamily="34" charset="-120"/>
+              </a:rPr>
+              <a:t>Adicione</a:t>
+            </a:r>
+            <a:r>
+              <a:rPr lang="en-US" sz="2800" dirty="0">
+                <a:solidFill>
+                  <a:srgbClr val="EBECEF"/>
+                </a:solidFill>
+                <a:latin typeface="Fraunces" pitchFamily="34" charset="0"/>
+                <a:ea typeface="Fraunces" pitchFamily="34" charset="-122"/>
+                <a:cs typeface="Fraunces" pitchFamily="34" charset="-120"/>
+              </a:rPr>
+              <a:t> um contêiner de injeção de </a:t>
+            </a:r>
+            <a:r>
+              <a:rPr lang="en-US" sz="2800" dirty="0" err="1">
+                <a:solidFill>
+                  <a:srgbClr val="EBECEF"/>
+                </a:solidFill>
+                <a:latin typeface="Fraunces" pitchFamily="34" charset="0"/>
+                <a:ea typeface="Fraunces" pitchFamily="34" charset="-122"/>
+                <a:cs typeface="Fraunces" pitchFamily="34" charset="-120"/>
+              </a:rPr>
+              <a:t>dependência</a:t>
+            </a:r>
+            <a:endParaRPr lang="en-US" sz="2800" dirty="0">
+              <a:solidFill>
+                <a:srgbClr val="EBECEF"/>
+              </a:solidFill>
+              <a:latin typeface="Fraunces" pitchFamily="34" charset="0"/>
+              <a:ea typeface="Fraunces" pitchFamily="34" charset="-122"/>
+              <a:cs typeface="Fraunces" pitchFamily="34" charset="-120"/>
+            </a:endParaRPr>
+          </a:p>
+          <a:p>
+            <a:pPr marL="0" indent="0" algn="r">
+              <a:lnSpc>
+                <a:spcPts val="2209"/>
+              </a:lnSpc>
+              <a:buNone/>
+            </a:pPr>
+            <a:endParaRPr lang="en-US" sz="2800" dirty="0">
+              <a:solidFill>
+                <a:srgbClr val="EBECEF"/>
+              </a:solidFill>
+              <a:latin typeface="Fraunces" pitchFamily="34" charset="0"/>
+              <a:ea typeface="Fraunces" pitchFamily="34" charset="-122"/>
+            </a:endParaRPr>
+          </a:p>
+          <a:p>
+            <a:pPr marL="0" indent="0" algn="r">
+              <a:lnSpc>
+                <a:spcPts val="2209"/>
+              </a:lnSpc>
+              <a:buNone/>
+            </a:pPr>
+            <a:endParaRPr lang="en-US" sz="2800" dirty="0"/>
           </a:p>
         </p:txBody>
       </p:sp>
@@ -3335,8 +4266,8 @@
         </p:nvSpPr>
         <p:spPr>
           <a:xfrm>
-            <a:off x="3871198" y="4900613"/>
-            <a:ext cx="2221944" cy="347186"/>
+            <a:off x="439936" y="3792973"/>
+            <a:ext cx="5887879" cy="1256347"/>
           </a:xfrm>
           <a:prstGeom prst="rect">
             <a:avLst/>
@@ -3345,54 +4276,12 @@
           <a:ln/>
         </p:spPr>
         <p:txBody>
-          <a:bodyPr wrap="none" rtlCol="0" anchor="t"/>
+          <a:bodyPr wrap="square" rtlCol="0" anchor="t"/>
           <a:lstStyle/>
           <a:p>
             <a:pPr marL="0" indent="0" algn="r">
               <a:lnSpc>
-                <a:spcPts val="2734"/>
-              </a:lnSpc>
-              <a:buNone/>
-            </a:pPr>
-            <a:r>
-              <a:rPr lang="en-US" sz="2800" dirty="0">
-                <a:solidFill>
-                  <a:srgbClr val="EBECEF"/>
-                </a:solidFill>
-                <a:latin typeface="Fraunces" pitchFamily="34" charset="0"/>
-                <a:ea typeface="Fraunces" pitchFamily="34" charset="-122"/>
-                <a:cs typeface="Fraunces" pitchFamily="34" charset="-120"/>
-              </a:rPr>
-              <a:t>Criar abstrações</a:t>
-            </a:r>
-            <a:endParaRPr lang="en-US" sz="2800" dirty="0"/>
-          </a:p>
-        </p:txBody>
-      </p:sp>
-      <p:sp>
-        <p:nvSpPr>
-          <p:cNvPr id="16" name="Text 14"/>
-          <p:cNvSpPr/>
-          <p:nvPr/>
-        </p:nvSpPr>
-        <p:spPr>
-          <a:xfrm>
-            <a:off x="2037993" y="5469969"/>
-            <a:ext cx="4055150" cy="710803"/>
-          </a:xfrm>
-          <a:prstGeom prst="rect">
-            <a:avLst/>
-          </a:prstGeom>
-          <a:noFill/>
-          <a:ln/>
-        </p:spPr>
-        <p:txBody>
-          <a:bodyPr wrap="square" rtlCol="0" anchor="t"/>
-          <a:lstStyle/>
-          <a:p>
-            <a:pPr marL="0" indent="0" algn="r">
-              <a:lnSpc>
-                <a:spcPts val="2799"/>
+                <a:spcPts val="2262"/>
               </a:lnSpc>
               <a:buNone/>
             </a:pPr>
@@ -3405,7 +4294,7 @@
                 <a:ea typeface="Epilogue" pitchFamily="34" charset="-122"/>
                 <a:cs typeface="Epilogue" pitchFamily="34" charset="-120"/>
               </a:rPr>
-              <a:t>Criar as abstrações necessárias para desacoplar as dependências.</a:t>
+              <a:t>Depois de ter identificado suas dependências, você precisará adicionar um contêiner de injeção de dependência em seu projeto.</a:t>
             </a:r>
             <a:endParaRPr lang="en-US" sz="2000" dirty="0"/>
           </a:p>
@@ -3413,51 +4302,51 @@
       </p:sp>
       <p:sp>
         <p:nvSpPr>
+          <p:cNvPr id="16" name="Shape 14"/>
+          <p:cNvSpPr/>
+          <p:nvPr/>
+        </p:nvSpPr>
+        <p:spPr>
+          <a:xfrm>
+            <a:off x="7517011" y="4733985"/>
+            <a:ext cx="628293" cy="35838"/>
+          </a:xfrm>
+          <a:prstGeom prst="rect">
+            <a:avLst/>
+          </a:prstGeom>
+          <a:solidFill>
+            <a:srgbClr val="303B69"/>
+          </a:solidFill>
+          <a:ln/>
+        </p:spPr>
+        <p:txBody>
+          <a:bodyPr/>
+          <a:lstStyle/>
+          <a:p>
+            <a:endParaRPr lang="pt-BR" dirty="0"/>
+          </a:p>
+        </p:txBody>
+      </p:sp>
+      <p:sp>
+        <p:nvSpPr>
           <p:cNvPr id="17" name="Shape 15"/>
           <p:cNvSpPr/>
           <p:nvPr/>
         </p:nvSpPr>
         <p:spPr>
           <a:xfrm>
-            <a:off x="7565172" y="6079510"/>
-            <a:ext cx="777597" cy="44410"/>
-          </a:xfrm>
-          <a:prstGeom prst="rect">
-            <a:avLst/>
-          </a:prstGeom>
-          <a:solidFill>
-            <a:srgbClr val="303B69"/>
-          </a:solidFill>
-          <a:ln/>
-        </p:spPr>
-        <p:txBody>
-          <a:bodyPr/>
-          <a:lstStyle/>
-          <a:p>
-            <a:endParaRPr lang="pt-BR"/>
-          </a:p>
-        </p:txBody>
-      </p:sp>
-      <p:sp>
-        <p:nvSpPr>
-          <p:cNvPr id="18" name="Shape 16"/>
-          <p:cNvSpPr/>
-          <p:nvPr/>
-        </p:nvSpPr>
-        <p:spPr>
-          <a:xfrm>
-            <a:off x="7065228" y="5851803"/>
-            <a:ext cx="499943" cy="499943"/>
+            <a:off x="7113151" y="4550093"/>
+            <a:ext cx="403860" cy="403860"/>
           </a:xfrm>
           <a:prstGeom prst="roundRect">
             <a:avLst>
-              <a:gd name="adj" fmla="val 20000"/>
+              <a:gd name="adj" fmla="val 20002"/>
             </a:avLst>
           </a:prstGeom>
           <a:solidFill>
             <a:srgbClr val="283157"/>
           </a:solidFill>
-          <a:ln w="13811">
+          <a:ln w="11192">
             <a:solidFill>
               <a:srgbClr val="303B69"/>
             </a:solidFill>
@@ -3468,7 +4357,49 @@
           <a:bodyPr/>
           <a:lstStyle/>
           <a:p>
-            <a:endParaRPr lang="pt-BR"/>
+            <a:endParaRPr lang="pt-BR" dirty="0"/>
+          </a:p>
+        </p:txBody>
+      </p:sp>
+      <p:sp>
+        <p:nvSpPr>
+          <p:cNvPr id="18" name="Text 16"/>
+          <p:cNvSpPr/>
+          <p:nvPr/>
+        </p:nvSpPr>
+        <p:spPr>
+          <a:xfrm>
+            <a:off x="7238881" y="4583668"/>
+            <a:ext cx="152400" cy="336590"/>
+          </a:xfrm>
+          <a:prstGeom prst="rect">
+            <a:avLst/>
+          </a:prstGeom>
+          <a:noFill/>
+          <a:ln/>
+        </p:spPr>
+        <p:txBody>
+          <a:bodyPr wrap="none" rtlCol="0" anchor="t"/>
+          <a:lstStyle/>
+          <a:p>
+            <a:pPr marL="0" indent="0" algn="ctr">
+              <a:lnSpc>
+                <a:spcPts val="2650"/>
+              </a:lnSpc>
+              <a:buNone/>
+            </a:pPr>
+            <a:r>
+              <a:rPr lang="en-US" sz="2120" dirty="0">
+                <a:solidFill>
+                  <a:srgbClr val="EBECEF"/>
+                </a:solidFill>
+                <a:latin typeface="Fraunces" pitchFamily="34" charset="0"/>
+                <a:ea typeface="Fraunces" pitchFamily="34" charset="-122"/>
+                <a:cs typeface="Fraunces" pitchFamily="34" charset="-120"/>
+              </a:rPr>
+              <a:t>3</a:t>
+            </a:r>
+            <a:endParaRPr lang="en-US" sz="2120" dirty="0"/>
           </a:p>
         </p:txBody>
       </p:sp>
@@ -3480,8 +4411,8 @@
         </p:nvSpPr>
         <p:spPr>
           <a:xfrm>
-            <a:off x="7223700" y="5893475"/>
-            <a:ext cx="182880" cy="416481"/>
+            <a:off x="8302347" y="4589264"/>
+            <a:ext cx="5138619" cy="740450"/>
           </a:xfrm>
           <a:prstGeom prst="rect">
             <a:avLst/>
@@ -3490,27 +4421,27 @@
           <a:ln/>
         </p:spPr>
         <p:txBody>
-          <a:bodyPr wrap="none" rtlCol="0" anchor="t"/>
-          <a:lstStyle/>
-          <a:p>
-            <a:pPr marL="0" indent="0" algn="ctr">
-              <a:lnSpc>
-                <a:spcPts val="3281"/>
-              </a:lnSpc>
-              <a:buNone/>
-            </a:pPr>
-            <a:r>
-              <a:rPr lang="en-US" sz="2624" dirty="0">
-                <a:solidFill>
-                  <a:srgbClr val="EBECEF"/>
-                </a:solidFill>
-                <a:latin typeface="Fraunces" pitchFamily="34" charset="0"/>
-                <a:ea typeface="Fraunces" pitchFamily="34" charset="-122"/>
-                <a:cs typeface="Fraunces" pitchFamily="34" charset="-120"/>
-              </a:rPr>
-              <a:t>3</a:t>
-            </a:r>
-            <a:endParaRPr lang="en-US" sz="2624" dirty="0"/>
+          <a:bodyPr wrap="square" rtlCol="0" anchor="t"/>
+          <a:lstStyle/>
+          <a:p>
+            <a:pPr marL="0" indent="0" algn="l">
+              <a:lnSpc>
+                <a:spcPts val="2209"/>
+              </a:lnSpc>
+              <a:buNone/>
+            </a:pPr>
+            <a:r>
+              <a:rPr lang="en-US" sz="2800" dirty="0">
+                <a:solidFill>
+                  <a:srgbClr val="EBECEF"/>
+                </a:solidFill>
+                <a:latin typeface="Fraunces" pitchFamily="34" charset="0"/>
+                <a:ea typeface="Fraunces" pitchFamily="34" charset="-122"/>
+                <a:cs typeface="Fraunces" pitchFamily="34" charset="-120"/>
+              </a:rPr>
+              <a:t>Configure seu contêiner de injeção de dependência</a:t>
+            </a:r>
+            <a:endParaRPr lang="en-US" sz="2800" dirty="0"/>
           </a:p>
         </p:txBody>
       </p:sp>
@@ -3522,8 +4453,8 @@
         </p:nvSpPr>
         <p:spPr>
           <a:xfrm>
-            <a:off x="8537258" y="5900380"/>
-            <a:ext cx="2377440" cy="347186"/>
+            <a:off x="8302347" y="5329714"/>
+            <a:ext cx="5888117" cy="1217390"/>
           </a:xfrm>
           <a:prstGeom prst="rect">
             <a:avLst/>
@@ -3532,54 +4463,12 @@
           <a:ln/>
         </p:spPr>
         <p:txBody>
-          <a:bodyPr wrap="none" rtlCol="0" anchor="t"/>
+          <a:bodyPr wrap="square" rtlCol="0" anchor="t"/>
           <a:lstStyle/>
           <a:p>
             <a:pPr marL="0" indent="0" algn="l">
               <a:lnSpc>
-                <a:spcPts val="2734"/>
-              </a:lnSpc>
-              <a:buNone/>
-            </a:pPr>
-            <a:r>
-              <a:rPr lang="en-US" sz="2800" dirty="0">
-                <a:solidFill>
-                  <a:srgbClr val="EBECEF"/>
-                </a:solidFill>
-                <a:latin typeface="Fraunces" pitchFamily="34" charset="0"/>
-                <a:ea typeface="Fraunces" pitchFamily="34" charset="-122"/>
-                <a:cs typeface="Fraunces" pitchFamily="34" charset="-120"/>
-              </a:rPr>
-              <a:t>Inserir abstrações</a:t>
-            </a:r>
-            <a:endParaRPr lang="en-US" sz="2800" dirty="0"/>
-          </a:p>
-        </p:txBody>
-      </p:sp>
-      <p:sp>
-        <p:nvSpPr>
-          <p:cNvPr id="21" name="Text 19"/>
-          <p:cNvSpPr/>
-          <p:nvPr/>
-        </p:nvSpPr>
-        <p:spPr>
-          <a:xfrm>
-            <a:off x="8537258" y="6469737"/>
-            <a:ext cx="4055150" cy="710803"/>
-          </a:xfrm>
-          <a:prstGeom prst="rect">
-            <a:avLst/>
-          </a:prstGeom>
-          <a:noFill/>
-          <a:ln/>
-        </p:spPr>
-        <p:txBody>
-          <a:bodyPr wrap="square" rtlCol="0" anchor="t"/>
-          <a:lstStyle/>
-          <a:p>
-            <a:pPr marL="0" indent="0" algn="l">
-              <a:lnSpc>
-                <a:spcPts val="2799"/>
+                <a:spcPts val="2262"/>
               </a:lnSpc>
               <a:buNone/>
             </a:pPr>
@@ -3592,7 +4481,194 @@
                 <a:ea typeface="Epilogue" pitchFamily="34" charset="-122"/>
                 <a:cs typeface="Epilogue" pitchFamily="34" charset="-120"/>
               </a:rPr>
-              <a:t>Inserir as abstrações nos módulos dependentes.</a:t>
+              <a:t>Em seguida, você precisará configurar seu contêiner. Isto dependerá do contêiner de injeção que você utilizar.</a:t>
+            </a:r>
+            <a:endParaRPr lang="en-US" sz="2000" dirty="0"/>
+          </a:p>
+        </p:txBody>
+      </p:sp>
+      <p:sp>
+        <p:nvSpPr>
+          <p:cNvPr id="21" name="Shape 19"/>
+          <p:cNvSpPr/>
+          <p:nvPr/>
+        </p:nvSpPr>
+        <p:spPr>
+          <a:xfrm>
+            <a:off x="6484858" y="5804118"/>
+            <a:ext cx="628293" cy="35838"/>
+          </a:xfrm>
+          <a:prstGeom prst="rect">
+            <a:avLst/>
+          </a:prstGeom>
+          <a:solidFill>
+            <a:srgbClr val="303B69"/>
+          </a:solidFill>
+          <a:ln/>
+        </p:spPr>
+        <p:txBody>
+          <a:bodyPr/>
+          <a:lstStyle/>
+          <a:p>
+            <a:endParaRPr lang="pt-BR" dirty="0"/>
+          </a:p>
+        </p:txBody>
+      </p:sp>
+      <p:sp>
+        <p:nvSpPr>
+          <p:cNvPr id="22" name="Shape 20"/>
+          <p:cNvSpPr/>
+          <p:nvPr/>
+        </p:nvSpPr>
+        <p:spPr>
+          <a:xfrm>
+            <a:off x="7113151" y="5620226"/>
+            <a:ext cx="403860" cy="403860"/>
+          </a:xfrm>
+          <a:prstGeom prst="roundRect">
+            <a:avLst>
+              <a:gd name="adj" fmla="val 20002"/>
+            </a:avLst>
+          </a:prstGeom>
+          <a:solidFill>
+            <a:srgbClr val="283157"/>
+          </a:solidFill>
+          <a:ln w="11192">
+            <a:solidFill>
+              <a:srgbClr val="303B69"/>
+            </a:solidFill>
+            <a:prstDash val="solid"/>
+          </a:ln>
+        </p:spPr>
+        <p:txBody>
+          <a:bodyPr/>
+          <a:lstStyle/>
+          <a:p>
+            <a:endParaRPr lang="pt-BR" dirty="0"/>
+          </a:p>
+        </p:txBody>
+      </p:sp>
+      <p:sp>
+        <p:nvSpPr>
+          <p:cNvPr id="23" name="Text 21"/>
+          <p:cNvSpPr/>
+          <p:nvPr/>
+        </p:nvSpPr>
+        <p:spPr>
+          <a:xfrm>
+            <a:off x="7231261" y="5653802"/>
+            <a:ext cx="167640" cy="336590"/>
+          </a:xfrm>
+          <a:prstGeom prst="rect">
+            <a:avLst/>
+          </a:prstGeom>
+          <a:noFill/>
+          <a:ln/>
+        </p:spPr>
+        <p:txBody>
+          <a:bodyPr wrap="none" rtlCol="0" anchor="t"/>
+          <a:lstStyle/>
+          <a:p>
+            <a:pPr marL="0" indent="0" algn="ctr">
+              <a:lnSpc>
+                <a:spcPts val="2650"/>
+              </a:lnSpc>
+              <a:buNone/>
+            </a:pPr>
+            <a:r>
+              <a:rPr lang="en-US" sz="2120" dirty="0">
+                <a:solidFill>
+                  <a:srgbClr val="EBECEF"/>
+                </a:solidFill>
+                <a:latin typeface="Fraunces" pitchFamily="34" charset="0"/>
+                <a:ea typeface="Fraunces" pitchFamily="34" charset="-122"/>
+                <a:cs typeface="Fraunces" pitchFamily="34" charset="-120"/>
+              </a:rPr>
+              <a:t>4</a:t>
+            </a:r>
+            <a:endParaRPr lang="en-US" sz="2120" dirty="0"/>
+          </a:p>
+        </p:txBody>
+      </p:sp>
+      <p:sp>
+        <p:nvSpPr>
+          <p:cNvPr id="24" name="Text 22"/>
+          <p:cNvSpPr/>
+          <p:nvPr/>
+        </p:nvSpPr>
+        <p:spPr>
+          <a:xfrm>
+            <a:off x="2438400" y="5659398"/>
+            <a:ext cx="3889415" cy="280511"/>
+          </a:xfrm>
+          <a:prstGeom prst="rect">
+            <a:avLst/>
+          </a:prstGeom>
+          <a:noFill/>
+          <a:ln/>
+        </p:spPr>
+        <p:txBody>
+          <a:bodyPr wrap="none" rtlCol="0" anchor="t"/>
+          <a:lstStyle/>
+          <a:p>
+            <a:pPr marL="0" indent="0" algn="r">
+              <a:lnSpc>
+                <a:spcPts val="2209"/>
+              </a:lnSpc>
+              <a:buNone/>
+            </a:pPr>
+            <a:r>
+              <a:rPr lang="en-US" sz="2800" dirty="0">
+                <a:solidFill>
+                  <a:srgbClr val="EBECEF"/>
+                </a:solidFill>
+                <a:latin typeface="Fraunces" pitchFamily="34" charset="0"/>
+                <a:ea typeface="Fraunces" pitchFamily="34" charset="-122"/>
+                <a:cs typeface="Fraunces" pitchFamily="34" charset="-120"/>
+              </a:rPr>
+              <a:t>Injete suas dependências</a:t>
+            </a:r>
+            <a:endParaRPr lang="en-US" sz="2800" dirty="0"/>
+          </a:p>
+        </p:txBody>
+      </p:sp>
+      <p:sp>
+        <p:nvSpPr>
+          <p:cNvPr id="25" name="Text 23"/>
+          <p:cNvSpPr/>
+          <p:nvPr/>
+        </p:nvSpPr>
+        <p:spPr>
+          <a:xfrm>
+            <a:off x="439936" y="6119336"/>
+            <a:ext cx="5887879" cy="1829848"/>
+          </a:xfrm>
+          <a:prstGeom prst="rect">
+            <a:avLst/>
+          </a:prstGeom>
+          <a:noFill/>
+          <a:ln/>
+        </p:spPr>
+        <p:txBody>
+          <a:bodyPr wrap="square" rtlCol="0" anchor="t"/>
+          <a:lstStyle/>
+          <a:p>
+            <a:pPr marL="0" indent="0" algn="r">
+              <a:lnSpc>
+                <a:spcPts val="2262"/>
+              </a:lnSpc>
+              <a:buNone/>
+            </a:pPr>
+            <a:r>
+              <a:rPr lang="en-US" sz="2000" dirty="0">
+                <a:solidFill>
+                  <a:srgbClr val="EBECEF"/>
+                </a:solidFill>
+                <a:latin typeface="Epilogue" pitchFamily="34" charset="0"/>
+                <a:ea typeface="Epilogue" pitchFamily="34" charset="-122"/>
+                <a:cs typeface="Epilogue" pitchFamily="34" charset="-120"/>
+              </a:rPr>
+              <a:t>por último, você precisa injetar suas dependências nas classes que as utilizam. Você pode fazer isso ou marcá-las com atributos que definem o tipo de injeção de dependência a ser utilizada quando seu contêiner for configurado.</a:t>
             </a:r>
             <a:endParaRPr lang="en-US" sz="2000" dirty="0"/>
           </a:p>
@@ -3606,9 +4682,9 @@
 </p:sld>
 </file>
 
-<file path=ppt/slides/slide6.xml><?xml version="1.0" encoding="utf-8"?>
+<file path=ppt/slides/slide7.xml><?xml version="1.0" encoding="utf-8"?>
 <p:sld xmlns:a="http://schemas.openxmlformats.org/drawingml/2006/main" xmlns:r="http://schemas.openxmlformats.org/officeDocument/2006/relationships" xmlns:p="http://schemas.openxmlformats.org/presentationml/2006/main">
-  <p:cSld name="Slide 8">
+  <p:cSld>
     <p:spTree>
       <p:nvGrpSpPr>
         <p:cNvPr id="1" name=""/>
@@ -3646,7 +4722,7 @@
           <a:bodyPr/>
           <a:lstStyle/>
           <a:p>
-            <a:endParaRPr lang="pt-BR"/>
+            <a:endParaRPr lang="pt-BR" dirty="0"/>
           </a:p>
         </p:txBody>
       </p:sp>
@@ -3658,7 +4734,7 @@
         </p:nvSpPr>
         <p:spPr>
           <a:xfrm>
-            <a:off x="0" y="0"/>
+            <a:off x="0" y="8095"/>
             <a:ext cx="14630400" cy="8229600"/>
           </a:xfrm>
           <a:prstGeom prst="rect">
@@ -3667,7 +4743,7 @@
           <a:solidFill>
             <a:srgbClr val="080E26"/>
           </a:solidFill>
-          <a:ln w="13811">
+          <a:ln w="13454">
             <a:solidFill>
               <a:srgbClr val="565151"/>
             </a:solidFill>
@@ -3678,7 +4754,7 @@
           <a:bodyPr/>
           <a:lstStyle/>
           <a:p>
-            <a:endParaRPr lang="pt-BR"/>
+            <a:endParaRPr lang="pt-BR" sz="2800" dirty="0"/>
           </a:p>
         </p:txBody>
       </p:sp>
@@ -3690,8 +4766,8 @@
         </p:nvSpPr>
         <p:spPr>
           <a:xfrm>
-            <a:off x="833199" y="1840349"/>
-            <a:ext cx="7477601" cy="2083118"/>
+            <a:off x="812721" y="807125"/>
+            <a:ext cx="5341620" cy="677228"/>
           </a:xfrm>
           <a:prstGeom prst="rect">
             <a:avLst/>
@@ -3700,40 +4776,158 @@
           <a:ln/>
         </p:spPr>
         <p:txBody>
+          <a:bodyPr wrap="none" rtlCol="0" anchor="t"/>
+          <a:lstStyle/>
+          <a:p>
+            <a:pPr marL="0" indent="0">
+              <a:lnSpc>
+                <a:spcPts val="5333"/>
+              </a:lnSpc>
+              <a:buNone/>
+            </a:pPr>
+            <a:r>
+              <a:rPr lang="en-US" sz="4267" dirty="0">
+                <a:solidFill>
+                  <a:srgbClr val="FFFFFF"/>
+                </a:solidFill>
+                <a:latin typeface="Fraunces" pitchFamily="34" charset="0"/>
+                <a:ea typeface="Fraunces" pitchFamily="34" charset="-122"/>
+                <a:cs typeface="Fraunces" pitchFamily="34" charset="-120"/>
+              </a:rPr>
+              <a:t>Considerações finais</a:t>
+            </a:r>
+            <a:endParaRPr lang="en-US" sz="4267" dirty="0"/>
+          </a:p>
+        </p:txBody>
+      </p:sp>
+      <p:sp>
+        <p:nvSpPr>
+          <p:cNvPr id="5" name="Shape 3"/>
+          <p:cNvSpPr/>
+          <p:nvPr/>
+        </p:nvSpPr>
+        <p:spPr>
+          <a:xfrm>
+            <a:off x="812721" y="1978700"/>
+            <a:ext cx="487680" cy="487680"/>
+          </a:xfrm>
+          <a:prstGeom prst="roundRect">
+            <a:avLst>
+              <a:gd name="adj" fmla="val 20000"/>
+            </a:avLst>
+          </a:prstGeom>
+          <a:solidFill>
+            <a:srgbClr val="283157"/>
+          </a:solidFill>
+          <a:ln w="13454">
+            <a:solidFill>
+              <a:srgbClr val="303B69"/>
+            </a:solidFill>
+            <a:prstDash val="solid"/>
+          </a:ln>
+        </p:spPr>
+        <p:txBody>
+          <a:bodyPr/>
+          <a:lstStyle/>
+          <a:p>
+            <a:endParaRPr lang="pt-BR" dirty="0"/>
+          </a:p>
+        </p:txBody>
+      </p:sp>
+      <p:sp>
+        <p:nvSpPr>
+          <p:cNvPr id="6" name="Text 4"/>
+          <p:cNvSpPr/>
+          <p:nvPr/>
+        </p:nvSpPr>
+        <p:spPr>
+          <a:xfrm>
+            <a:off x="980361" y="2019300"/>
+            <a:ext cx="152400" cy="406360"/>
+          </a:xfrm>
+          <a:prstGeom prst="rect">
+            <a:avLst/>
+          </a:prstGeom>
+          <a:noFill/>
+          <a:ln/>
+        </p:spPr>
+        <p:txBody>
+          <a:bodyPr wrap="none" rtlCol="0" anchor="t"/>
+          <a:lstStyle/>
+          <a:p>
+            <a:pPr marL="0" indent="0" algn="ctr">
+              <a:lnSpc>
+                <a:spcPts val="3200"/>
+              </a:lnSpc>
+              <a:buNone/>
+            </a:pPr>
+            <a:r>
+              <a:rPr lang="en-US" sz="2560" dirty="0">
+                <a:solidFill>
+                  <a:srgbClr val="EBECEF"/>
+                </a:solidFill>
+                <a:latin typeface="Fraunces" pitchFamily="34" charset="0"/>
+                <a:ea typeface="Fraunces" pitchFamily="34" charset="-122"/>
+                <a:cs typeface="Fraunces" pitchFamily="34" charset="-120"/>
+              </a:rPr>
+              <a:t>1</a:t>
+            </a:r>
+            <a:endParaRPr lang="en-US" sz="2560" dirty="0"/>
+          </a:p>
+        </p:txBody>
+      </p:sp>
+      <p:sp>
+        <p:nvSpPr>
+          <p:cNvPr id="7" name="Text 5"/>
+          <p:cNvSpPr/>
+          <p:nvPr/>
+        </p:nvSpPr>
+        <p:spPr>
+          <a:xfrm>
+            <a:off x="1517094" y="2053233"/>
+            <a:ext cx="3738086" cy="487680"/>
+          </a:xfrm>
+          <a:prstGeom prst="rect">
+            <a:avLst/>
+          </a:prstGeom>
+          <a:noFill/>
+          <a:ln/>
+        </p:spPr>
+        <p:txBody>
           <a:bodyPr wrap="square" rtlCol="0" anchor="t"/>
           <a:lstStyle/>
           <a:p>
             <a:pPr marL="0" indent="0">
               <a:lnSpc>
-                <a:spcPts val="5468"/>
-              </a:lnSpc>
-              <a:buNone/>
-            </a:pPr>
-            <a:r>
-              <a:rPr lang="en-US" sz="4374" dirty="0">
-                <a:solidFill>
-                  <a:srgbClr val="FFFFFF"/>
-                </a:solidFill>
-                <a:latin typeface="Fraunces" pitchFamily="34" charset="0"/>
-                <a:ea typeface="Fraunces" pitchFamily="34" charset="-122"/>
-                <a:cs typeface="Fraunces" pitchFamily="34" charset="-120"/>
-              </a:rPr>
-              <a:t>Considerações finais sobre o Princípio de Inversão de Dependência</a:t>
-            </a:r>
-            <a:endParaRPr lang="en-US" sz="4374" dirty="0"/>
-          </a:p>
-        </p:txBody>
-      </p:sp>
-      <p:sp>
-        <p:nvSpPr>
-          <p:cNvPr id="5" name="Text 3"/>
-          <p:cNvSpPr/>
-          <p:nvPr/>
-        </p:nvSpPr>
-        <p:spPr>
-          <a:xfrm>
-            <a:off x="833199" y="4256723"/>
-            <a:ext cx="7477601" cy="2132409"/>
+                <a:spcPts val="2667"/>
+              </a:lnSpc>
+              <a:buNone/>
+            </a:pPr>
+            <a:r>
+              <a:rPr lang="en-US" sz="2800" dirty="0">
+                <a:solidFill>
+                  <a:srgbClr val="EBECEF"/>
+                </a:solidFill>
+                <a:latin typeface="Fraunces" pitchFamily="34" charset="0"/>
+                <a:ea typeface="Fraunces" pitchFamily="34" charset="-122"/>
+                <a:cs typeface="Fraunces" pitchFamily="34" charset="-120"/>
+              </a:rPr>
+              <a:t>Pense Estrategicamente</a:t>
+            </a:r>
+            <a:endParaRPr lang="en-US" sz="2800" dirty="0"/>
+          </a:p>
+        </p:txBody>
+      </p:sp>
+      <p:sp>
+        <p:nvSpPr>
+          <p:cNvPr id="8" name="Text 6"/>
+          <p:cNvSpPr/>
+          <p:nvPr/>
+        </p:nvSpPr>
+        <p:spPr>
+          <a:xfrm>
+            <a:off x="1517094" y="2947391"/>
+            <a:ext cx="2946559" cy="2351009"/>
           </a:xfrm>
           <a:prstGeom prst="rect">
             <a:avLst/>
@@ -3747,7 +4941,7 @@
           <a:p>
             <a:pPr marL="0" indent="0">
               <a:lnSpc>
-                <a:spcPts val="2799"/>
+                <a:spcPts val="2731"/>
               </a:lnSpc>
               <a:buNone/>
             </a:pPr>
@@ -3760,36 +4954,563 @@
                 <a:ea typeface="Epilogue" pitchFamily="34" charset="-122"/>
                 <a:cs typeface="Epilogue" pitchFamily="34" charset="-120"/>
               </a:rPr>
-              <a:t>O Princípio de Inversão de Dependência é uma abordagem fundamental para a construção de software escalável e flexível. Em conjunto com a Injeção de Dependência, ele pode tornar seu código mais testável e fácil de manter. Lembre-se de aplicar o Princípio de Responsabilidade Única para garantir que cada classe tenha apenas uma responsabilidade.</a:t>
+              <a:t>A </a:t>
+            </a:r>
+            <a:r>
+              <a:rPr lang="en-US" sz="2000" dirty="0" err="1">
+                <a:solidFill>
+                  <a:srgbClr val="EBECEF"/>
+                </a:solidFill>
+                <a:latin typeface="Epilogue" pitchFamily="34" charset="0"/>
+                <a:ea typeface="Epilogue" pitchFamily="34" charset="-122"/>
+                <a:cs typeface="Epilogue" pitchFamily="34" charset="-120"/>
+              </a:rPr>
+              <a:t>inversão</a:t>
+            </a:r>
+            <a:r>
+              <a:rPr lang="en-US" sz="2000" dirty="0">
+                <a:solidFill>
+                  <a:srgbClr val="EBECEF"/>
+                </a:solidFill>
+                <a:latin typeface="Epilogue" pitchFamily="34" charset="0"/>
+                <a:ea typeface="Epilogue" pitchFamily="34" charset="-122"/>
+                <a:cs typeface="Epilogue" pitchFamily="34" charset="-120"/>
+              </a:rPr>
+              <a:t>/</a:t>
+            </a:r>
+            <a:r>
+              <a:rPr lang="en-US" sz="2000" dirty="0" err="1">
+                <a:solidFill>
+                  <a:srgbClr val="EBECEF"/>
+                </a:solidFill>
+                <a:latin typeface="Epilogue" pitchFamily="34" charset="0"/>
+                <a:ea typeface="Epilogue" pitchFamily="34" charset="-122"/>
+                <a:cs typeface="Epilogue" pitchFamily="34" charset="-120"/>
+              </a:rPr>
+              <a:t>injeção</a:t>
+            </a:r>
+            <a:r>
+              <a:rPr lang="en-US" sz="2000" dirty="0">
+                <a:solidFill>
+                  <a:srgbClr val="EBECEF"/>
+                </a:solidFill>
+                <a:latin typeface="Epilogue" pitchFamily="34" charset="0"/>
+                <a:ea typeface="Epilogue" pitchFamily="34" charset="-122"/>
+                <a:cs typeface="Epilogue" pitchFamily="34" charset="-120"/>
+              </a:rPr>
+              <a:t> de dependência é uma técnica reutilizável que pode ajudar a produzir códigos reutilizáveis e sustentáveis a longo prazo.</a:t>
             </a:r>
             <a:endParaRPr lang="en-US" sz="2000" dirty="0"/>
           </a:p>
         </p:txBody>
       </p:sp>
-      <p:pic>
-        <p:nvPicPr>
-          <p:cNvPr id="6" name="Image 0" descr="preencoded.png"/>
-          <p:cNvPicPr>
-            <a:picLocks noChangeAspect="1"/>
-          </p:cNvPicPr>
-          <p:nvPr/>
-        </p:nvPicPr>
-        <p:blipFill>
-          <a:blip r:embed="rId3"/>
-          <a:stretch>
-            <a:fillRect/>
-          </a:stretch>
-        </p:blipFill>
-        <p:spPr>
-          <a:xfrm>
-            <a:off x="9144000" y="0"/>
-            <a:ext cx="5486400" cy="8229600"/>
-          </a:xfrm>
-          <a:prstGeom prst="rect">
-            <a:avLst/>
-          </a:prstGeom>
-        </p:spPr>
-      </p:pic>
+      <p:sp>
+        <p:nvSpPr>
+          <p:cNvPr id="9" name="Shape 7"/>
+          <p:cNvSpPr/>
+          <p:nvPr/>
+        </p:nvSpPr>
+        <p:spPr>
+          <a:xfrm>
+            <a:off x="7315200" y="1918761"/>
+            <a:ext cx="487680" cy="487680"/>
+          </a:xfrm>
+          <a:prstGeom prst="roundRect">
+            <a:avLst>
+              <a:gd name="adj" fmla="val 20000"/>
+            </a:avLst>
+          </a:prstGeom>
+          <a:solidFill>
+            <a:srgbClr val="283157"/>
+          </a:solidFill>
+          <a:ln w="13454">
+            <a:solidFill>
+              <a:srgbClr val="303B69"/>
+            </a:solidFill>
+            <a:prstDash val="solid"/>
+          </a:ln>
+        </p:spPr>
+        <p:txBody>
+          <a:bodyPr/>
+          <a:lstStyle/>
+          <a:p>
+            <a:endParaRPr lang="pt-BR" dirty="0"/>
+          </a:p>
+        </p:txBody>
+      </p:sp>
+      <p:sp>
+        <p:nvSpPr>
+          <p:cNvPr id="10" name="Text 8"/>
+          <p:cNvSpPr/>
+          <p:nvPr/>
+        </p:nvSpPr>
+        <p:spPr>
+          <a:xfrm>
+            <a:off x="7469742" y="1959361"/>
+            <a:ext cx="198120" cy="406360"/>
+          </a:xfrm>
+          <a:prstGeom prst="rect">
+            <a:avLst/>
+          </a:prstGeom>
+          <a:noFill/>
+          <a:ln/>
+        </p:spPr>
+        <p:txBody>
+          <a:bodyPr wrap="none" rtlCol="0" anchor="t"/>
+          <a:lstStyle/>
+          <a:p>
+            <a:pPr marL="0" indent="0" algn="ctr">
+              <a:lnSpc>
+                <a:spcPts val="3200"/>
+              </a:lnSpc>
+              <a:buNone/>
+            </a:pPr>
+            <a:r>
+              <a:rPr lang="en-US" sz="2560" dirty="0">
+                <a:solidFill>
+                  <a:srgbClr val="EBECEF"/>
+                </a:solidFill>
+                <a:latin typeface="Fraunces" pitchFamily="34" charset="0"/>
+                <a:ea typeface="Fraunces" pitchFamily="34" charset="-122"/>
+                <a:cs typeface="Fraunces" pitchFamily="34" charset="-120"/>
+              </a:rPr>
+              <a:t>2</a:t>
+            </a:r>
+            <a:endParaRPr lang="en-US" sz="2560" dirty="0"/>
+          </a:p>
+        </p:txBody>
+      </p:sp>
+      <p:sp>
+        <p:nvSpPr>
+          <p:cNvPr id="11" name="Text 9"/>
+          <p:cNvSpPr/>
+          <p:nvPr/>
+        </p:nvSpPr>
+        <p:spPr>
+          <a:xfrm>
+            <a:off x="8029336" y="1993294"/>
+            <a:ext cx="6442568" cy="1016198"/>
+          </a:xfrm>
+          <a:prstGeom prst="rect">
+            <a:avLst/>
+          </a:prstGeom>
+          <a:noFill/>
+          <a:ln/>
+        </p:spPr>
+        <p:txBody>
+          <a:bodyPr wrap="square" rtlCol="0" anchor="t"/>
+          <a:lstStyle/>
+          <a:p>
+            <a:pPr marL="0" indent="0">
+              <a:lnSpc>
+                <a:spcPts val="2667"/>
+              </a:lnSpc>
+              <a:buNone/>
+            </a:pPr>
+            <a:r>
+              <a:rPr lang="en-US" sz="2800" dirty="0">
+                <a:solidFill>
+                  <a:srgbClr val="EBECEF"/>
+                </a:solidFill>
+                <a:latin typeface="Fraunces" pitchFamily="34" charset="0"/>
+                <a:ea typeface="Fraunces" pitchFamily="34" charset="-122"/>
+                <a:cs typeface="Fraunces" pitchFamily="34" charset="-120"/>
+              </a:rPr>
+              <a:t>Use </a:t>
+            </a:r>
+            <a:r>
+              <a:rPr lang="en-US" sz="2800" dirty="0" err="1">
+                <a:solidFill>
+                  <a:srgbClr val="EBECEF"/>
+                </a:solidFill>
+                <a:latin typeface="Fraunces" pitchFamily="34" charset="0"/>
+                <a:ea typeface="Fraunces" pitchFamily="34" charset="-122"/>
+                <a:cs typeface="Fraunces" pitchFamily="34" charset="-120"/>
+              </a:rPr>
+              <a:t>uma</a:t>
+            </a:r>
+            <a:r>
+              <a:rPr lang="en-US" sz="2800" dirty="0">
+                <a:solidFill>
+                  <a:srgbClr val="EBECEF"/>
+                </a:solidFill>
+                <a:latin typeface="Fraunces" pitchFamily="34" charset="0"/>
+                <a:ea typeface="Fraunces" pitchFamily="34" charset="-122"/>
+                <a:cs typeface="Fraunces" pitchFamily="34" charset="-120"/>
+              </a:rPr>
+              <a:t> </a:t>
+            </a:r>
+            <a:r>
+              <a:rPr lang="en-US" sz="2800" dirty="0" err="1">
+                <a:solidFill>
+                  <a:srgbClr val="EBECEF"/>
+                </a:solidFill>
+                <a:latin typeface="Fraunces" pitchFamily="34" charset="0"/>
+                <a:ea typeface="Fraunces" pitchFamily="34" charset="-122"/>
+                <a:cs typeface="Fraunces" pitchFamily="34" charset="-120"/>
+              </a:rPr>
+              <a:t>biblioteca</a:t>
+            </a:r>
+            <a:r>
+              <a:rPr lang="en-US" sz="2800" dirty="0">
+                <a:solidFill>
+                  <a:srgbClr val="EBECEF"/>
+                </a:solidFill>
+                <a:latin typeface="Fraunces" pitchFamily="34" charset="0"/>
+                <a:ea typeface="Fraunces" pitchFamily="34" charset="-122"/>
+                <a:cs typeface="Fraunces" pitchFamily="34" charset="-120"/>
+              </a:rPr>
+              <a:t> </a:t>
+            </a:r>
+            <a:r>
+              <a:rPr lang="en-US" sz="2800" dirty="0" err="1">
+                <a:solidFill>
+                  <a:srgbClr val="EBECEF"/>
+                </a:solidFill>
+                <a:latin typeface="Fraunces" pitchFamily="34" charset="0"/>
+                <a:ea typeface="Fraunces" pitchFamily="34" charset="-122"/>
+                <a:cs typeface="Fraunces" pitchFamily="34" charset="-120"/>
+              </a:rPr>
+              <a:t>injetora</a:t>
+            </a:r>
+            <a:r>
+              <a:rPr lang="en-US" sz="2800" dirty="0">
+                <a:solidFill>
+                  <a:srgbClr val="EBECEF"/>
+                </a:solidFill>
+                <a:latin typeface="Fraunces" pitchFamily="34" charset="0"/>
+                <a:ea typeface="Fraunces" pitchFamily="34" charset="-122"/>
+                <a:cs typeface="Fraunces" pitchFamily="34" charset="-120"/>
+              </a:rPr>
+              <a:t> de </a:t>
+            </a:r>
+            <a:r>
+              <a:rPr lang="en-US" sz="2800" dirty="0" err="1">
+                <a:solidFill>
+                  <a:srgbClr val="EBECEF"/>
+                </a:solidFill>
+                <a:latin typeface="Fraunces" pitchFamily="34" charset="0"/>
+                <a:ea typeface="Fraunces" pitchFamily="34" charset="-122"/>
+                <a:cs typeface="Fraunces" pitchFamily="34" charset="-120"/>
+              </a:rPr>
+              <a:t>dependência</a:t>
+            </a:r>
+            <a:endParaRPr lang="en-US" sz="2800" dirty="0"/>
+          </a:p>
+        </p:txBody>
+      </p:sp>
+      <p:sp>
+        <p:nvSpPr>
+          <p:cNvPr id="12" name="Text 10"/>
+          <p:cNvSpPr/>
+          <p:nvPr/>
+        </p:nvSpPr>
+        <p:spPr>
+          <a:xfrm>
+            <a:off x="8029335" y="2883523"/>
+            <a:ext cx="6247497" cy="2359923"/>
+          </a:xfrm>
+          <a:prstGeom prst="rect">
+            <a:avLst/>
+          </a:prstGeom>
+          <a:noFill/>
+          <a:ln/>
+        </p:spPr>
+        <p:txBody>
+          <a:bodyPr wrap="square" rtlCol="0" anchor="t"/>
+          <a:lstStyle/>
+          <a:p>
+            <a:pPr marL="0" indent="0">
+              <a:lnSpc>
+                <a:spcPts val="2731"/>
+              </a:lnSpc>
+              <a:buNone/>
+            </a:pPr>
+            <a:r>
+              <a:rPr lang="en-US" sz="2000" dirty="0">
+                <a:solidFill>
+                  <a:srgbClr val="EBECEF"/>
+                </a:solidFill>
+                <a:latin typeface="Epilogue" pitchFamily="34" charset="0"/>
+                <a:ea typeface="Epilogue" pitchFamily="34" charset="-122"/>
+                <a:cs typeface="Epilogue" pitchFamily="34" charset="-120"/>
+              </a:rPr>
+              <a:t>Não há necessidade de reinventar a roda. </a:t>
+            </a:r>
+            <a:endParaRPr lang="en-US" sz="2000" dirty="0"/>
+          </a:p>
+        </p:txBody>
+      </p:sp>
+      <p:sp>
+        <p:nvSpPr>
+          <p:cNvPr id="13" name="Shape 11"/>
+          <p:cNvSpPr/>
+          <p:nvPr/>
+        </p:nvSpPr>
+        <p:spPr>
+          <a:xfrm>
+            <a:off x="812721" y="5752386"/>
+            <a:ext cx="487680" cy="487680"/>
+          </a:xfrm>
+          <a:prstGeom prst="roundRect">
+            <a:avLst>
+              <a:gd name="adj" fmla="val 20000"/>
+            </a:avLst>
+          </a:prstGeom>
+          <a:solidFill>
+            <a:srgbClr val="283157"/>
+          </a:solidFill>
+          <a:ln w="13454">
+            <a:solidFill>
+              <a:srgbClr val="303B69"/>
+            </a:solidFill>
+            <a:prstDash val="solid"/>
+          </a:ln>
+        </p:spPr>
+        <p:txBody>
+          <a:bodyPr/>
+          <a:lstStyle/>
+          <a:p>
+            <a:endParaRPr lang="pt-BR" dirty="0"/>
+          </a:p>
+        </p:txBody>
+      </p:sp>
+      <p:sp>
+        <p:nvSpPr>
+          <p:cNvPr id="14" name="Text 12"/>
+          <p:cNvSpPr/>
+          <p:nvPr/>
+        </p:nvSpPr>
+        <p:spPr>
+          <a:xfrm>
+            <a:off x="965121" y="5792986"/>
+            <a:ext cx="182880" cy="406360"/>
+          </a:xfrm>
+          <a:prstGeom prst="rect">
+            <a:avLst/>
+          </a:prstGeom>
+          <a:noFill/>
+          <a:ln/>
+        </p:spPr>
+        <p:txBody>
+          <a:bodyPr wrap="none" rtlCol="0" anchor="t"/>
+          <a:lstStyle/>
+          <a:p>
+            <a:pPr marL="0" indent="0" algn="ctr">
+              <a:lnSpc>
+                <a:spcPts val="3200"/>
+              </a:lnSpc>
+              <a:buNone/>
+            </a:pPr>
+            <a:r>
+              <a:rPr lang="en-US" sz="2560" dirty="0">
+                <a:solidFill>
+                  <a:srgbClr val="EBECEF"/>
+                </a:solidFill>
+                <a:latin typeface="Fraunces" pitchFamily="34" charset="0"/>
+                <a:ea typeface="Fraunces" pitchFamily="34" charset="-122"/>
+                <a:cs typeface="Fraunces" pitchFamily="34" charset="-120"/>
+              </a:rPr>
+              <a:t>3</a:t>
+            </a:r>
+            <a:endParaRPr lang="en-US" sz="2560" dirty="0"/>
+          </a:p>
+        </p:txBody>
+      </p:sp>
+      <p:sp>
+        <p:nvSpPr>
+          <p:cNvPr id="15" name="Text 13"/>
+          <p:cNvSpPr/>
+          <p:nvPr/>
+        </p:nvSpPr>
+        <p:spPr>
+          <a:xfrm>
+            <a:off x="1517093" y="5826919"/>
+            <a:ext cx="7452245" cy="338733"/>
+          </a:xfrm>
+          <a:prstGeom prst="rect">
+            <a:avLst/>
+          </a:prstGeom>
+          <a:noFill/>
+          <a:ln/>
+        </p:spPr>
+        <p:txBody>
+          <a:bodyPr wrap="none" rtlCol="0" anchor="t"/>
+          <a:lstStyle/>
+          <a:p>
+            <a:pPr marL="0" indent="0">
+              <a:lnSpc>
+                <a:spcPts val="2667"/>
+              </a:lnSpc>
+              <a:buNone/>
+            </a:pPr>
+            <a:r>
+              <a:rPr lang="en-US" sz="2800" dirty="0" err="1">
+                <a:solidFill>
+                  <a:srgbClr val="EBECEF"/>
+                </a:solidFill>
+                <a:latin typeface="Fraunces" pitchFamily="34" charset="0"/>
+                <a:ea typeface="Fraunces" pitchFamily="34" charset="-122"/>
+                <a:cs typeface="Fraunces" pitchFamily="34" charset="-120"/>
+              </a:rPr>
+              <a:t>Não</a:t>
+            </a:r>
+            <a:r>
+              <a:rPr lang="en-US" sz="2800" dirty="0">
+                <a:solidFill>
+                  <a:srgbClr val="EBECEF"/>
+                </a:solidFill>
+                <a:latin typeface="Fraunces" pitchFamily="34" charset="0"/>
+                <a:ea typeface="Fraunces" pitchFamily="34" charset="-122"/>
+                <a:cs typeface="Fraunces" pitchFamily="34" charset="-120"/>
+              </a:rPr>
+              <a:t> use </a:t>
+            </a:r>
+            <a:r>
+              <a:rPr lang="en-US" sz="2800" dirty="0" err="1">
+                <a:solidFill>
+                  <a:srgbClr val="EBECEF"/>
+                </a:solidFill>
+                <a:latin typeface="Fraunces" pitchFamily="34" charset="0"/>
+                <a:ea typeface="Fraunces" pitchFamily="34" charset="-122"/>
+                <a:cs typeface="Fraunces" pitchFamily="34" charset="-120"/>
+              </a:rPr>
+              <a:t>injeção</a:t>
+            </a:r>
+            <a:r>
+              <a:rPr lang="en-US" sz="2800" dirty="0">
+                <a:solidFill>
+                  <a:srgbClr val="EBECEF"/>
+                </a:solidFill>
+                <a:latin typeface="Fraunces" pitchFamily="34" charset="0"/>
+                <a:ea typeface="Fraunces" pitchFamily="34" charset="-122"/>
+                <a:cs typeface="Fraunces" pitchFamily="34" charset="-120"/>
+              </a:rPr>
+              <a:t> de </a:t>
+            </a:r>
+            <a:r>
+              <a:rPr lang="en-US" sz="2800" dirty="0" err="1">
+                <a:solidFill>
+                  <a:srgbClr val="EBECEF"/>
+                </a:solidFill>
+                <a:latin typeface="Fraunces" pitchFamily="34" charset="0"/>
+                <a:ea typeface="Fraunces" pitchFamily="34" charset="-122"/>
+                <a:cs typeface="Fraunces" pitchFamily="34" charset="-120"/>
+              </a:rPr>
+              <a:t>dependência</a:t>
+            </a:r>
+            <a:r>
+              <a:rPr lang="en-US" sz="2800" dirty="0">
+                <a:solidFill>
+                  <a:srgbClr val="EBECEF"/>
+                </a:solidFill>
+                <a:latin typeface="Fraunces" pitchFamily="34" charset="0"/>
+                <a:ea typeface="Fraunces" pitchFamily="34" charset="-122"/>
+                <a:cs typeface="Fraunces" pitchFamily="34" charset="-120"/>
+              </a:rPr>
+              <a:t> </a:t>
+            </a:r>
+            <a:r>
+              <a:rPr lang="en-US" sz="2800" dirty="0" err="1">
+                <a:solidFill>
+                  <a:srgbClr val="EBECEF"/>
+                </a:solidFill>
+                <a:latin typeface="Fraunces" pitchFamily="34" charset="0"/>
+                <a:ea typeface="Fraunces" pitchFamily="34" charset="-122"/>
+                <a:cs typeface="Fraunces" pitchFamily="34" charset="-120"/>
+              </a:rPr>
+              <a:t>em</a:t>
+            </a:r>
+            <a:r>
+              <a:rPr lang="en-US" sz="2800" dirty="0">
+                <a:solidFill>
+                  <a:srgbClr val="EBECEF"/>
+                </a:solidFill>
+                <a:latin typeface="Fraunces" pitchFamily="34" charset="0"/>
+                <a:ea typeface="Fraunces" pitchFamily="34" charset="-122"/>
+                <a:cs typeface="Fraunces" pitchFamily="34" charset="-120"/>
+              </a:rPr>
+              <a:t> </a:t>
+            </a:r>
+            <a:r>
+              <a:rPr lang="en-US" sz="2800" dirty="0" err="1">
+                <a:solidFill>
+                  <a:srgbClr val="EBECEF"/>
+                </a:solidFill>
+                <a:latin typeface="Fraunces" pitchFamily="34" charset="0"/>
+                <a:ea typeface="Fraunces" pitchFamily="34" charset="-122"/>
+                <a:cs typeface="Fraunces" pitchFamily="34" charset="-120"/>
+              </a:rPr>
+              <a:t>todo</a:t>
+            </a:r>
+            <a:r>
+              <a:rPr lang="en-US" sz="2800" dirty="0">
+                <a:solidFill>
+                  <a:srgbClr val="EBECEF"/>
+                </a:solidFill>
+                <a:latin typeface="Fraunces" pitchFamily="34" charset="0"/>
+                <a:ea typeface="Fraunces" pitchFamily="34" charset="-122"/>
+                <a:cs typeface="Fraunces" pitchFamily="34" charset="-120"/>
+              </a:rPr>
+              <a:t> </a:t>
+            </a:r>
+            <a:r>
+              <a:rPr lang="en-US" sz="2800" dirty="0" err="1">
+                <a:solidFill>
+                  <a:srgbClr val="EBECEF"/>
+                </a:solidFill>
+                <a:latin typeface="Fraunces" pitchFamily="34" charset="0"/>
+                <a:ea typeface="Fraunces" pitchFamily="34" charset="-122"/>
+                <a:cs typeface="Fraunces" pitchFamily="34" charset="-120"/>
+              </a:rPr>
+              <a:t>lugar</a:t>
+            </a:r>
+            <a:endParaRPr lang="en-US" sz="2800" dirty="0"/>
+          </a:p>
+        </p:txBody>
+      </p:sp>
+      <p:sp>
+        <p:nvSpPr>
+          <p:cNvPr id="16" name="Text 14"/>
+          <p:cNvSpPr/>
+          <p:nvPr/>
+        </p:nvSpPr>
+        <p:spPr>
+          <a:xfrm>
+            <a:off x="1517094" y="6382345"/>
+            <a:ext cx="6814185" cy="1179962"/>
+          </a:xfrm>
+          <a:prstGeom prst="rect">
+            <a:avLst/>
+          </a:prstGeom>
+          <a:noFill/>
+          <a:ln/>
+        </p:spPr>
+        <p:txBody>
+          <a:bodyPr wrap="square" rtlCol="0" anchor="t"/>
+          <a:lstStyle/>
+          <a:p>
+            <a:pPr marL="0" indent="0">
+              <a:lnSpc>
+                <a:spcPts val="2731"/>
+              </a:lnSpc>
+              <a:buNone/>
+            </a:pPr>
+            <a:r>
+              <a:rPr lang="en-US" sz="2000" dirty="0">
+                <a:solidFill>
+                  <a:srgbClr val="EBECEF"/>
+                </a:solidFill>
+                <a:latin typeface="Epilogue" pitchFamily="34" charset="0"/>
+                <a:ea typeface="Epilogue" pitchFamily="34" charset="-122"/>
+                <a:cs typeface="Epilogue" pitchFamily="34" charset="-120"/>
+              </a:rPr>
+              <a:t>Lembre-se sempre de que nem todos os problemas são solucionáveis através de injeção de dependência. Use com moderação e sabedoria.</a:t>
+            </a:r>
+            <a:endParaRPr lang="en-US" sz="2000" dirty="0"/>
+          </a:p>
+        </p:txBody>
+      </p:sp>
     </p:spTree>
   </p:cSld>
   <p:clrMapOvr>
@@ -3798,7 +5519,7 @@
 </p:sld>
 </file>
 
-<file path=ppt/slides/slide7.xml><?xml version="1.0" encoding="utf-8"?>
+<file path=ppt/slides/slide8.xml><?xml version="1.0" encoding="utf-8"?>
 <p:sld xmlns:a="http://schemas.openxmlformats.org/drawingml/2006/main" xmlns:r="http://schemas.openxmlformats.org/officeDocument/2006/relationships" xmlns:p="http://schemas.openxmlformats.org/presentationml/2006/main">
   <p:cSld>
     <p:spTree>

</xml_diff>